<commit_message>
[2023-02-24] RMS(v3.0) - AMS 주간보고 자동 작성 (v1)
</commit_message>
<xml_diff>
--- a/src/main/webapp/WEB-INF/Files/2023-02/20/erp2023-02-20.pptx
+++ b/src/main/webapp/WEB-INF/Files/2023-02/20/erp2023-02-20.pptx
@@ -10,7 +10,7 @@
     <p:sldId id="2563" r:id="rId3"/>
     <p:sldId id="2564" r:id="rId4"/>
   </p:sldIdLst>
-  <p:sldSz cx="10414000" cy="7556500" type="custom"/>
+  <p:sldSz cx="9906000" cy="7556500" type="custom"/>
   <p:notesSz cx="6858000" cy="9144000"/>
   <p:embeddedFontLst>
 </p:embeddedFontLst>
@@ -87,17 +87,17 @@
       </p:grpSpPr>
       <p:sp>
         <p:nvSpPr>
-          <p:cNvPr id="356373325" name="Text">
-    </p:cNvPr>
-          <p:cNvSpPr>
-            <a:spLocks noGrp="1"/>
-          </p:cNvSpPr>
-          <p:nvPr/>
-        </p:nvSpPr>
-        <p:spPr>
-          <a:xfrm rot="0">
-            <a:off x="5664200" y="838200"/>
-            <a:ext cx="4673600" cy="381000"/>
+          <p:cNvPr id="1784930366" name="Text">
+    </p:cNvPr>
+          <p:cNvSpPr>
+            <a:spLocks noGrp="1"/>
+          </p:cNvSpPr>
+          <p:nvPr/>
+        </p:nvSpPr>
+        <p:spPr>
+          <a:xfrm rot="0">
+            <a:off x="5219700" y="825500"/>
+            <a:ext cx="4660900" cy="381000"/>
           </a:xfrm>
           <a:prstGeom prst="rect">
             <a:avLst/>
@@ -136,17 +136,17 @@
       </p:sp>
       <p:sp>
         <p:nvSpPr>
-          <p:cNvPr id="270499054" name="Text">
-    </p:cNvPr>
-          <p:cNvSpPr>
-            <a:spLocks noGrp="1"/>
-          </p:cNvSpPr>
-          <p:nvPr/>
-        </p:nvSpPr>
-        <p:spPr>
-          <a:xfrm rot="0">
-            <a:off x="114300" y="838200"/>
-            <a:ext cx="5245100" cy="381000"/>
+          <p:cNvPr id="1891965782" name="Text">
+    </p:cNvPr>
+          <p:cNvSpPr>
+            <a:spLocks noGrp="1"/>
+          </p:cNvSpPr>
+          <p:nvPr/>
+        </p:nvSpPr>
+        <p:spPr>
+          <a:xfrm rot="0">
+            <a:off x="88900" y="825500"/>
+            <a:ext cx="5067300" cy="381000"/>
           </a:xfrm>
           <a:prstGeom prst="rect">
             <a:avLst/>
@@ -185,17 +185,17 @@
       </p:sp>
       <p:sp>
         <p:nvSpPr>
-          <p:cNvPr id="1462982808" name="Text">
-    </p:cNvPr>
-          <p:cNvSpPr>
-            <a:spLocks noGrp="1"/>
-          </p:cNvSpPr>
-          <p:nvPr/>
-        </p:nvSpPr>
-        <p:spPr>
-          <a:xfrm rot="0">
-            <a:off x="139700" y="800100"/>
-            <a:ext cx="5168900" cy="381000"/>
+          <p:cNvPr id="2112043961" name="Text">
+    </p:cNvPr>
+          <p:cNvSpPr>
+            <a:spLocks noGrp="1"/>
+          </p:cNvSpPr>
+          <p:nvPr/>
+        </p:nvSpPr>
+        <p:spPr>
+          <a:xfrm rot="0">
+            <a:off x="63500" y="800100"/>
+            <a:ext cx="5054600" cy="381000"/>
           </a:xfrm>
           <a:prstGeom prst="rect">
             <a:avLst/>
@@ -234,17 +234,17 @@
       </p:sp>
       <p:sp>
         <p:nvSpPr>
-          <p:cNvPr id="2131217728" name="Text">
-    </p:cNvPr>
-          <p:cNvSpPr>
-            <a:spLocks noGrp="1"/>
-          </p:cNvSpPr>
-          <p:nvPr/>
-        </p:nvSpPr>
-        <p:spPr>
-          <a:xfrm rot="0">
-            <a:off x="5664200" y="800100"/>
-            <a:ext cx="4622800" cy="381000"/>
+          <p:cNvPr id="469911611" name="Text">
+    </p:cNvPr>
+          <p:cNvSpPr>
+            <a:spLocks noGrp="1"/>
+          </p:cNvSpPr>
+          <p:nvPr/>
+        </p:nvSpPr>
+        <p:spPr>
+          <a:xfrm rot="0">
+            <a:off x="5232400" y="800100"/>
+            <a:ext cx="4610100" cy="381000"/>
           </a:xfrm>
           <a:prstGeom prst="rect">
             <a:avLst/>
@@ -283,7 +283,7 @@
       </p:sp>
       <p:sp>
         <p:nvSpPr>
-          <p:cNvPr id="81514070" name="Text">
+          <p:cNvPr id="1771383189" name="Text">
     </p:cNvPr>
           <p:cNvSpPr>
             <a:spLocks noGrp="1"/>
@@ -329,7 +329,7 @@
       </p:sp>
       <p:sp>
         <p:nvSpPr>
-          <p:cNvPr id="1875388975" name="Text">
+          <p:cNvPr id="835883098" name="Text">
     </p:cNvPr>
           <p:cNvSpPr>
             <a:spLocks noGrp="1"/>
@@ -393,7 +393,7 @@
       </p:sp>
       <p:sp>
         <p:nvSpPr>
-          <p:cNvPr id="586303702" name="Text">
+          <p:cNvPr id="1426610986" name="Text">
     </p:cNvPr>
           <p:cNvSpPr>
             <a:spLocks noGrp="1"/>
@@ -403,7 +403,7 @@
         <p:spPr>
           <a:xfrm rot="0">
             <a:off x="647700" y="1295400"/>
-            <a:ext cx="3340100" cy="469900"/>
+            <a:ext cx="3111500" cy="469900"/>
           </a:xfrm>
           <a:prstGeom prst="rect">
             <a:avLst/>
@@ -448,17 +448,17 @@
       </p:sp>
       <p:sp>
         <p:nvSpPr>
-          <p:cNvPr id="1667169285" name="Text">
-    </p:cNvPr>
-          <p:cNvSpPr>
-            <a:spLocks noGrp="1"/>
-          </p:cNvSpPr>
-          <p:nvPr/>
-        </p:nvSpPr>
-        <p:spPr>
-          <a:xfrm rot="0">
-            <a:off x="3987800" y="1295400"/>
-            <a:ext cx="520700" cy="469900"/>
+          <p:cNvPr id="1539674656" name="Text">
+    </p:cNvPr>
+          <p:cNvSpPr>
+            <a:spLocks noGrp="1"/>
+          </p:cNvSpPr>
+          <p:nvPr/>
+        </p:nvSpPr>
+        <p:spPr>
+          <a:xfrm rot="0">
+            <a:off x="3759200" y="1295400"/>
+            <a:ext cx="457200" cy="469900"/>
           </a:xfrm>
           <a:prstGeom prst="rect">
             <a:avLst/>
@@ -503,17 +503,17 @@
       </p:sp>
       <p:sp>
         <p:nvSpPr>
-          <p:cNvPr id="967649094" name="Text">
-    </p:cNvPr>
-          <p:cNvSpPr>
-            <a:spLocks noGrp="1"/>
-          </p:cNvSpPr>
-          <p:nvPr/>
-        </p:nvSpPr>
-        <p:spPr>
-          <a:xfrm rot="0">
-            <a:off x="4508500" y="1295400"/>
-            <a:ext cx="495300" cy="469900"/>
+          <p:cNvPr id="467452236" name="Text">
+    </p:cNvPr>
+          <p:cNvSpPr>
+            <a:spLocks noGrp="1"/>
+          </p:cNvSpPr>
+          <p:nvPr/>
+        </p:nvSpPr>
+        <p:spPr>
+          <a:xfrm rot="0">
+            <a:off x="4216400" y="1295400"/>
+            <a:ext cx="457200" cy="469900"/>
           </a:xfrm>
           <a:prstGeom prst="rect">
             <a:avLst/>
@@ -567,16 +567,16 @@
       </p:sp>
       <p:sp>
         <p:nvSpPr>
-          <p:cNvPr id="387640078" name="Text">
-    </p:cNvPr>
-          <p:cNvSpPr>
-            <a:spLocks noGrp="1"/>
-          </p:cNvSpPr>
-          <p:nvPr/>
-        </p:nvSpPr>
-        <p:spPr>
-          <a:xfrm rot="0">
-            <a:off x="5575300" y="1295400"/>
+          <p:cNvPr id="1042924077" name="Text">
+    </p:cNvPr>
+          <p:cNvSpPr>
+            <a:spLocks noGrp="1"/>
+          </p:cNvSpPr>
+          <p:nvPr/>
+        </p:nvSpPr>
+        <p:spPr>
+          <a:xfrm rot="0">
+            <a:off x="5207000" y="1295400"/>
             <a:ext cx="609600" cy="469900"/>
           </a:xfrm>
           <a:prstGeom prst="rect">
@@ -631,17 +631,17 @@
       </p:sp>
       <p:sp>
         <p:nvSpPr>
-          <p:cNvPr id="664708547" name="Text">
-    </p:cNvPr>
-          <p:cNvSpPr>
-            <a:spLocks noGrp="1"/>
-          </p:cNvSpPr>
-          <p:nvPr/>
-        </p:nvSpPr>
-        <p:spPr>
-          <a:xfrm rot="0">
-            <a:off x="6184900" y="1295400"/>
-            <a:ext cx="3213100" cy="469900"/>
+          <p:cNvPr id="695148489" name="Text">
+    </p:cNvPr>
+          <p:cNvSpPr>
+            <a:spLocks noGrp="1"/>
+          </p:cNvSpPr>
+          <p:nvPr/>
+        </p:nvSpPr>
+        <p:spPr>
+          <a:xfrm rot="0">
+            <a:off x="5816600" y="1295400"/>
+            <a:ext cx="3111500" cy="469900"/>
           </a:xfrm>
           <a:prstGeom prst="rect">
             <a:avLst/>
@@ -686,17 +686,17 @@
       </p:sp>
       <p:sp>
         <p:nvSpPr>
-          <p:cNvPr id="867486689" name="Text">
-    </p:cNvPr>
-          <p:cNvSpPr>
-            <a:spLocks noGrp="1"/>
-          </p:cNvSpPr>
-          <p:nvPr/>
-        </p:nvSpPr>
-        <p:spPr>
-          <a:xfrm rot="0">
-            <a:off x="9398000" y="1295400"/>
-            <a:ext cx="495300" cy="469900"/>
+          <p:cNvPr id="1582091350" name="Text">
+    </p:cNvPr>
+          <p:cNvSpPr>
+            <a:spLocks noGrp="1"/>
+          </p:cNvSpPr>
+          <p:nvPr/>
+        </p:nvSpPr>
+        <p:spPr>
+          <a:xfrm rot="0">
+            <a:off x="8928100" y="1295400"/>
+            <a:ext cx="457200" cy="469900"/>
           </a:xfrm>
           <a:prstGeom prst="rect">
             <a:avLst/>
@@ -741,16 +741,16 @@
       </p:sp>
       <p:sp>
         <p:nvSpPr>
-          <p:cNvPr id="1668505030" name="Text">
-    </p:cNvPr>
-          <p:cNvSpPr>
-            <a:spLocks noGrp="1"/>
-          </p:cNvSpPr>
-          <p:nvPr/>
-        </p:nvSpPr>
-        <p:spPr>
-          <a:xfrm rot="0">
-            <a:off x="5003800" y="1295400"/>
+          <p:cNvPr id="602382450" name="Text">
+    </p:cNvPr>
+          <p:cNvSpPr>
+            <a:spLocks noGrp="1"/>
+          </p:cNvSpPr>
+          <p:nvPr/>
+        </p:nvSpPr>
+        <p:spPr>
+          <a:xfrm rot="0">
+            <a:off x="4673600" y="1295400"/>
             <a:ext cx="469900" cy="469900"/>
           </a:xfrm>
           <a:prstGeom prst="rect">
@@ -805,17 +805,17 @@
       </p:sp>
       <p:sp>
         <p:nvSpPr>
-          <p:cNvPr id="603035709" name="Text">
-    </p:cNvPr>
-          <p:cNvSpPr>
-            <a:spLocks noGrp="1"/>
-          </p:cNvSpPr>
-          <p:nvPr/>
-        </p:nvSpPr>
-        <p:spPr>
-          <a:xfrm rot="0">
-            <a:off x="9893300" y="1295400"/>
-            <a:ext cx="469900" cy="469900"/>
+          <p:cNvPr id="1403987593" name="Text">
+    </p:cNvPr>
+          <p:cNvSpPr>
+            <a:spLocks noGrp="1"/>
+          </p:cNvSpPr>
+          <p:nvPr/>
+        </p:nvSpPr>
+        <p:spPr>
+          <a:xfrm rot="0">
+            <a:off x="9385300" y="1295400"/>
+            <a:ext cx="457200" cy="469900"/>
           </a:xfrm>
           <a:prstGeom prst="rect">
             <a:avLst/>
@@ -869,17 +869,17 @@
       </p:sp>
       <p:sp>
         <p:nvSpPr>
-          <p:cNvPr id="1905496381" name="Text">
-    </p:cNvPr>
-          <p:cNvSpPr>
-            <a:spLocks noGrp="1"/>
-          </p:cNvSpPr>
-          <p:nvPr/>
-        </p:nvSpPr>
-        <p:spPr>
-          <a:xfrm rot="0">
-            <a:off x="9893300" y="1765300"/>
-            <a:ext cx="469900" cy="1968500"/>
+          <p:cNvPr id="49281634" name="Text">
+    </p:cNvPr>
+          <p:cNvSpPr>
+            <a:spLocks noGrp="1"/>
+          </p:cNvSpPr>
+          <p:nvPr/>
+        </p:nvSpPr>
+        <p:spPr>
+          <a:xfrm rot="0">
+            <a:off x="9385300" y="1765300"/>
+            <a:ext cx="457200" cy="1968500"/>
           </a:xfrm>
           <a:prstGeom prst="rect">
             <a:avLst/>
@@ -973,17 +973,17 @@
       </p:sp>
       <p:sp>
         <p:nvSpPr>
-          <p:cNvPr id="1684907821" name="Text">
-    </p:cNvPr>
-          <p:cNvSpPr>
-            <a:spLocks noGrp="1"/>
-          </p:cNvSpPr>
-          <p:nvPr/>
-        </p:nvSpPr>
-        <p:spPr>
-          <a:xfrm rot="0">
-            <a:off x="9398000" y="1765300"/>
-            <a:ext cx="495300" cy="1968500"/>
+          <p:cNvPr id="981051413" name="Text">
+    </p:cNvPr>
+          <p:cNvSpPr>
+            <a:spLocks noGrp="1"/>
+          </p:cNvSpPr>
+          <p:nvPr/>
+        </p:nvSpPr>
+        <p:spPr>
+          <a:xfrm rot="0">
+            <a:off x="8928100" y="1765300"/>
+            <a:ext cx="457200" cy="1968500"/>
           </a:xfrm>
           <a:prstGeom prst="rect">
             <a:avLst/>
@@ -1077,17 +1077,17 @@
       </p:sp>
       <p:sp>
         <p:nvSpPr>
-          <p:cNvPr id="495536907" name="Text">
-    </p:cNvPr>
-          <p:cNvSpPr>
-            <a:spLocks noGrp="1"/>
-          </p:cNvSpPr>
-          <p:nvPr/>
-        </p:nvSpPr>
-        <p:spPr>
-          <a:xfrm rot="0">
-            <a:off x="6273800" y="1765300"/>
-            <a:ext cx="3111500" cy="1968500"/>
+          <p:cNvPr id="604203800" name="Text">
+    </p:cNvPr>
+          <p:cNvSpPr>
+            <a:spLocks noGrp="1"/>
+          </p:cNvSpPr>
+          <p:nvPr/>
+        </p:nvSpPr>
+        <p:spPr>
+          <a:xfrm rot="0">
+            <a:off x="5930900" y="1765300"/>
+            <a:ext cx="2984500" cy="1968500"/>
           </a:xfrm>
           <a:prstGeom prst="rect">
             <a:avLst/>
@@ -1223,16 +1223,16 @@
       </p:sp>
       <p:sp>
         <p:nvSpPr>
-          <p:cNvPr id="840308983" name="Text">
-    </p:cNvPr>
-          <p:cNvSpPr>
-            <a:spLocks noGrp="1"/>
-          </p:cNvSpPr>
-          <p:nvPr/>
-        </p:nvSpPr>
-        <p:spPr>
-          <a:xfrm rot="0">
-            <a:off x="5575300" y="1765300"/>
+          <p:cNvPr id="238197375" name="Text">
+    </p:cNvPr>
+          <p:cNvSpPr>
+            <a:spLocks noGrp="1"/>
+          </p:cNvSpPr>
+          <p:nvPr/>
+        </p:nvSpPr>
+        <p:spPr>
+          <a:xfrm rot="0">
+            <a:off x="5207000" y="1765300"/>
             <a:ext cx="609600" cy="1968500"/>
           </a:xfrm>
           <a:prstGeom prst="rect">
@@ -1303,7 +1303,7 @@
       </p:sp>
       <p:sp>
         <p:nvSpPr>
-          <p:cNvPr id="1600224753" name="Text">
+          <p:cNvPr id="1936940337" name="Text">
     </p:cNvPr>
           <p:cNvSpPr>
             <a:spLocks noGrp="1"/>
@@ -1383,17 +1383,17 @@
       </p:sp>
       <p:sp>
         <p:nvSpPr>
-          <p:cNvPr id="1455222271" name="Text">
-    </p:cNvPr>
-          <p:cNvSpPr>
-            <a:spLocks noGrp="1"/>
-          </p:cNvSpPr>
-          <p:nvPr/>
-        </p:nvSpPr>
-        <p:spPr>
-          <a:xfrm rot="0">
-            <a:off x="723900" y="1765300"/>
-            <a:ext cx="3251200" cy="1968500"/>
+          <p:cNvPr id="71137866" name="Text">
+    </p:cNvPr>
+          <p:cNvSpPr>
+            <a:spLocks noGrp="1"/>
+          </p:cNvSpPr>
+          <p:nvPr/>
+        </p:nvSpPr>
+        <p:spPr>
+          <a:xfrm rot="0">
+            <a:off x="762000" y="1765300"/>
+            <a:ext cx="2984500" cy="1968500"/>
           </a:xfrm>
           <a:prstGeom prst="rect">
             <a:avLst/>
@@ -1520,17 +1520,17 @@
       </p:sp>
       <p:sp>
         <p:nvSpPr>
-          <p:cNvPr id="28980528" name="Text">
-    </p:cNvPr>
-          <p:cNvSpPr>
-            <a:spLocks noGrp="1"/>
-          </p:cNvSpPr>
-          <p:nvPr/>
-        </p:nvSpPr>
-        <p:spPr>
-          <a:xfrm rot="0">
-            <a:off x="4508500" y="1765300"/>
-            <a:ext cx="495300" cy="1968500"/>
+          <p:cNvPr id="995727998" name="Text">
+    </p:cNvPr>
+          <p:cNvSpPr>
+            <a:spLocks noGrp="1"/>
+          </p:cNvSpPr>
+          <p:nvPr/>
+        </p:nvSpPr>
+        <p:spPr>
+          <a:xfrm rot="0">
+            <a:off x="4216400" y="1765300"/>
+            <a:ext cx="457200" cy="1968500"/>
           </a:xfrm>
           <a:prstGeom prst="rect">
             <a:avLst/>
@@ -1615,16 +1615,16 @@
       </p:sp>
       <p:sp>
         <p:nvSpPr>
-          <p:cNvPr id="65619024" name="Text">
-    </p:cNvPr>
-          <p:cNvSpPr>
-            <a:spLocks noGrp="1"/>
-          </p:cNvSpPr>
-          <p:nvPr/>
-        </p:nvSpPr>
-        <p:spPr>
-          <a:xfrm rot="0">
-            <a:off x="5003800" y="1765300"/>
+          <p:cNvPr id="564268552" name="Text">
+    </p:cNvPr>
+          <p:cNvSpPr>
+            <a:spLocks noGrp="1"/>
+          </p:cNvSpPr>
+          <p:nvPr/>
+        </p:nvSpPr>
+        <p:spPr>
+          <a:xfrm rot="0">
+            <a:off x="4673600" y="1765300"/>
             <a:ext cx="469900" cy="1968500"/>
           </a:xfrm>
           <a:prstGeom prst="rect">
@@ -1710,17 +1710,17 @@
       </p:sp>
       <p:sp>
         <p:nvSpPr>
-          <p:cNvPr id="1462972201" name="Text">
-    </p:cNvPr>
-          <p:cNvSpPr>
-            <a:spLocks noGrp="1"/>
-          </p:cNvSpPr>
-          <p:nvPr/>
-        </p:nvSpPr>
-        <p:spPr>
-          <a:xfrm rot="0">
-            <a:off x="3987800" y="1765300"/>
-            <a:ext cx="520700" cy="1968500"/>
+          <p:cNvPr id="1213289944" name="Text">
+    </p:cNvPr>
+          <p:cNvSpPr>
+            <a:spLocks noGrp="1"/>
+          </p:cNvSpPr>
+          <p:nvPr/>
+        </p:nvSpPr>
+        <p:spPr>
+          <a:xfrm rot="0">
+            <a:off x="3759200" y="1765300"/>
+            <a:ext cx="457200" cy="1968500"/>
           </a:xfrm>
           <a:prstGeom prst="rect">
             <a:avLst/>
@@ -1805,7 +1805,7 @@
       </p:sp>
       <p:sp>
         <p:nvSpPr>
-          <p:cNvPr id="1725035301" name="Text">
+          <p:cNvPr id="668043698" name="Text">
     </p:cNvPr>
           <p:cNvSpPr>
             <a:spLocks noGrp="1"/>
@@ -1815,7 +1815,7 @@
         <p:spPr>
           <a:xfrm rot="0">
             <a:off x="647700" y="1765300"/>
-            <a:ext cx="3340100" cy="1968500"/>
+            <a:ext cx="3111500" cy="1968500"/>
           </a:xfrm>
           <a:prstGeom prst="rect">
             <a:avLst/>
@@ -1857,17 +1857,17 @@
       </p:sp>
       <p:sp>
         <p:nvSpPr>
-          <p:cNvPr id="907168122" name="Text">
-    </p:cNvPr>
-          <p:cNvSpPr>
-            <a:spLocks noGrp="1"/>
-          </p:cNvSpPr>
-          <p:nvPr/>
-        </p:nvSpPr>
-        <p:spPr>
-          <a:xfrm rot="0">
-            <a:off x="6184900" y="1765300"/>
-            <a:ext cx="3213100" cy="1968500"/>
+          <p:cNvPr id="1345092956" name="Text">
+    </p:cNvPr>
+          <p:cNvSpPr>
+            <a:spLocks noGrp="1"/>
+          </p:cNvSpPr>
+          <p:nvPr/>
+        </p:nvSpPr>
+        <p:spPr>
+          <a:xfrm rot="0">
+            <a:off x="5816600" y="1765300"/>
+            <a:ext cx="3111500" cy="1968500"/>
           </a:xfrm>
           <a:prstGeom prst="rect">
             <a:avLst/>
@@ -1909,17 +1909,17 @@
       </p:sp>
       <p:sp>
         <p:nvSpPr>
-          <p:cNvPr id="2131771436" name="Text">
-    </p:cNvPr>
-          <p:cNvSpPr>
-            <a:spLocks noGrp="1"/>
-          </p:cNvSpPr>
-          <p:nvPr/>
-        </p:nvSpPr>
-        <p:spPr>
-          <a:xfrm rot="0">
-            <a:off x="9893300" y="3810000"/>
-            <a:ext cx="469900" cy="2882900"/>
+          <p:cNvPr id="1632631583" name="Text">
+    </p:cNvPr>
+          <p:cNvSpPr>
+            <a:spLocks noGrp="1"/>
+          </p:cNvSpPr>
+          <p:nvPr/>
+        </p:nvSpPr>
+        <p:spPr>
+          <a:xfrm rot="0">
+            <a:off x="9385300" y="3733800"/>
+            <a:ext cx="457200" cy="2882900"/>
           </a:xfrm>
           <a:prstGeom prst="rect">
             <a:avLst/>
@@ -2001,17 +2001,17 @@
       </p:sp>
       <p:sp>
         <p:nvSpPr>
-          <p:cNvPr id="823423616" name="Text">
-    </p:cNvPr>
-          <p:cNvSpPr>
-            <a:spLocks noGrp="1"/>
-          </p:cNvSpPr>
-          <p:nvPr/>
-        </p:nvSpPr>
-        <p:spPr>
-          <a:xfrm rot="0">
-            <a:off x="9398000" y="3810000"/>
-            <a:ext cx="495300" cy="2882900"/>
+          <p:cNvPr id="603102587" name="Text">
+    </p:cNvPr>
+          <p:cNvSpPr>
+            <a:spLocks noGrp="1"/>
+          </p:cNvSpPr>
+          <p:nvPr/>
+        </p:nvSpPr>
+        <p:spPr>
+          <a:xfrm rot="0">
+            <a:off x="8928100" y="3733800"/>
+            <a:ext cx="457200" cy="2882900"/>
           </a:xfrm>
           <a:prstGeom prst="rect">
             <a:avLst/>
@@ -2093,17 +2093,17 @@
       </p:sp>
       <p:sp>
         <p:nvSpPr>
-          <p:cNvPr id="1479931740" name="Text">
-    </p:cNvPr>
-          <p:cNvSpPr>
-            <a:spLocks noGrp="1"/>
-          </p:cNvSpPr>
-          <p:nvPr/>
-        </p:nvSpPr>
-        <p:spPr>
-          <a:xfrm rot="0">
-            <a:off x="6273800" y="3810000"/>
-            <a:ext cx="3111500" cy="2882900"/>
+          <p:cNvPr id="138747054" name="Text">
+    </p:cNvPr>
+          <p:cNvSpPr>
+            <a:spLocks noGrp="1"/>
+          </p:cNvSpPr>
+          <p:nvPr/>
+        </p:nvSpPr>
+        <p:spPr>
+          <a:xfrm rot="0">
+            <a:off x="5930900" y="3733800"/>
+            <a:ext cx="2984500" cy="2882900"/>
           </a:xfrm>
           <a:prstGeom prst="rect">
             <a:avLst/>
@@ -2203,16 +2203,16 @@
       </p:sp>
       <p:sp>
         <p:nvSpPr>
-          <p:cNvPr id="2093493433" name="Text">
-    </p:cNvPr>
-          <p:cNvSpPr>
-            <a:spLocks noGrp="1"/>
-          </p:cNvSpPr>
-          <p:nvPr/>
-        </p:nvSpPr>
-        <p:spPr>
-          <a:xfrm rot="0">
-            <a:off x="5575300" y="3810000"/>
+          <p:cNvPr id="993019495" name="Text">
+    </p:cNvPr>
+          <p:cNvSpPr>
+            <a:spLocks noGrp="1"/>
+          </p:cNvSpPr>
+          <p:nvPr/>
+        </p:nvSpPr>
+        <p:spPr>
+          <a:xfrm rot="0">
+            <a:off x="5207000" y="3733800"/>
             <a:ext cx="609600" cy="2882900"/>
           </a:xfrm>
           <a:prstGeom prst="rect">
@@ -2265,16 +2265,16 @@
       </p:sp>
       <p:sp>
         <p:nvSpPr>
-          <p:cNvPr id="27529772" name="Text">
-    </p:cNvPr>
-          <p:cNvSpPr>
-            <a:spLocks noGrp="1"/>
-          </p:cNvSpPr>
-          <p:nvPr/>
-        </p:nvSpPr>
-        <p:spPr>
-          <a:xfrm rot="0">
-            <a:off x="38100" y="3810000"/>
+          <p:cNvPr id="632931613" name="Text">
+    </p:cNvPr>
+          <p:cNvSpPr>
+            <a:spLocks noGrp="1"/>
+          </p:cNvSpPr>
+          <p:nvPr/>
+        </p:nvSpPr>
+        <p:spPr>
+          <a:xfrm rot="0">
+            <a:off x="38100" y="3733800"/>
             <a:ext cx="609600" cy="2882900"/>
           </a:xfrm>
           <a:prstGeom prst="rect">
@@ -2327,17 +2327,17 @@
       </p:sp>
       <p:sp>
         <p:nvSpPr>
-          <p:cNvPr id="322363626" name="Text">
-    </p:cNvPr>
-          <p:cNvSpPr>
-            <a:spLocks noGrp="1"/>
-          </p:cNvSpPr>
-          <p:nvPr/>
-        </p:nvSpPr>
-        <p:spPr>
-          <a:xfrm rot="0">
-            <a:off x="723900" y="3810000"/>
-            <a:ext cx="3251200" cy="2882900"/>
+          <p:cNvPr id="303533460" name="Text">
+    </p:cNvPr>
+          <p:cNvSpPr>
+            <a:spLocks noGrp="1"/>
+          </p:cNvSpPr>
+          <p:nvPr/>
+        </p:nvSpPr>
+        <p:spPr>
+          <a:xfrm rot="0">
+            <a:off x="762000" y="3733800"/>
+            <a:ext cx="2984500" cy="2882900"/>
           </a:xfrm>
           <a:prstGeom prst="rect">
             <a:avLst/>
@@ -2491,17 +2491,17 @@
       </p:sp>
       <p:sp>
         <p:nvSpPr>
-          <p:cNvPr id="1691253447" name="Text">
-    </p:cNvPr>
-          <p:cNvSpPr>
-            <a:spLocks noGrp="1"/>
-          </p:cNvSpPr>
-          <p:nvPr/>
-        </p:nvSpPr>
-        <p:spPr>
-          <a:xfrm rot="0">
-            <a:off x="4508500" y="3810000"/>
-            <a:ext cx="495300" cy="2882900"/>
+          <p:cNvPr id="848773908" name="Text">
+    </p:cNvPr>
+          <p:cNvSpPr>
+            <a:spLocks noGrp="1"/>
+          </p:cNvSpPr>
+          <p:nvPr/>
+        </p:nvSpPr>
+        <p:spPr>
+          <a:xfrm rot="0">
+            <a:off x="4216400" y="3733800"/>
+            <a:ext cx="457200" cy="2882900"/>
           </a:xfrm>
           <a:prstGeom prst="rect">
             <a:avLst/>
@@ -2621,16 +2621,16 @@
       </p:sp>
       <p:sp>
         <p:nvSpPr>
-          <p:cNvPr id="1558183205" name="Text">
-    </p:cNvPr>
-          <p:cNvSpPr>
-            <a:spLocks noGrp="1"/>
-          </p:cNvSpPr>
-          <p:nvPr/>
-        </p:nvSpPr>
-        <p:spPr>
-          <a:xfrm rot="0">
-            <a:off x="5003800" y="3810000"/>
+          <p:cNvPr id="195901535" name="Text">
+    </p:cNvPr>
+          <p:cNvSpPr>
+            <a:spLocks noGrp="1"/>
+          </p:cNvSpPr>
+          <p:nvPr/>
+        </p:nvSpPr>
+        <p:spPr>
+          <a:xfrm rot="0">
+            <a:off x="4673600" y="3733800"/>
             <a:ext cx="469900" cy="2882900"/>
           </a:xfrm>
           <a:prstGeom prst="rect">
@@ -2751,17 +2751,17 @@
       </p:sp>
       <p:sp>
         <p:nvSpPr>
-          <p:cNvPr id="1271970875" name="Text">
-    </p:cNvPr>
-          <p:cNvSpPr>
-            <a:spLocks noGrp="1"/>
-          </p:cNvSpPr>
-          <p:nvPr/>
-        </p:nvSpPr>
-        <p:spPr>
-          <a:xfrm rot="0">
-            <a:off x="3987800" y="3810000"/>
-            <a:ext cx="520700" cy="2882900"/>
+          <p:cNvPr id="1616348442" name="Text">
+    </p:cNvPr>
+          <p:cNvSpPr>
+            <a:spLocks noGrp="1"/>
+          </p:cNvSpPr>
+          <p:nvPr/>
+        </p:nvSpPr>
+        <p:spPr>
+          <a:xfrm rot="0">
+            <a:off x="3759200" y="3733800"/>
+            <a:ext cx="457200" cy="2882900"/>
           </a:xfrm>
           <a:prstGeom prst="rect">
             <a:avLst/>
@@ -2881,17 +2881,17 @@
       </p:sp>
       <p:sp>
         <p:nvSpPr>
-          <p:cNvPr id="1675502693" name="Text">
-    </p:cNvPr>
-          <p:cNvSpPr>
-            <a:spLocks noGrp="1"/>
-          </p:cNvSpPr>
-          <p:nvPr/>
-        </p:nvSpPr>
-        <p:spPr>
-          <a:xfrm rot="0">
-            <a:off x="647700" y="3810000"/>
-            <a:ext cx="3340100" cy="2882900"/>
+          <p:cNvPr id="1317199785" name="Text">
+    </p:cNvPr>
+          <p:cNvSpPr>
+            <a:spLocks noGrp="1"/>
+          </p:cNvSpPr>
+          <p:nvPr/>
+        </p:nvSpPr>
+        <p:spPr>
+          <a:xfrm rot="0">
+            <a:off x="647700" y="3733800"/>
+            <a:ext cx="3111500" cy="2882900"/>
           </a:xfrm>
           <a:prstGeom prst="rect">
             <a:avLst/>
@@ -2933,17 +2933,17 @@
       </p:sp>
       <p:sp>
         <p:nvSpPr>
-          <p:cNvPr id="1210333867" name="Text">
-    </p:cNvPr>
-          <p:cNvSpPr>
-            <a:spLocks noGrp="1"/>
-          </p:cNvSpPr>
-          <p:nvPr/>
-        </p:nvSpPr>
-        <p:spPr>
-          <a:xfrm rot="0">
-            <a:off x="6184900" y="3810000"/>
-            <a:ext cx="3213100" cy="2882900"/>
+          <p:cNvPr id="1183165070" name="Text">
+    </p:cNvPr>
+          <p:cNvSpPr>
+            <a:spLocks noGrp="1"/>
+          </p:cNvSpPr>
+          <p:nvPr/>
+        </p:nvSpPr>
+        <p:spPr>
+          <a:xfrm rot="0">
+            <a:off x="5816600" y="3733800"/>
+            <a:ext cx="3111500" cy="2882900"/>
           </a:xfrm>
           <a:prstGeom prst="rect">
             <a:avLst/>
@@ -3010,17 +3010,17 @@
       </p:grpSpPr>
       <p:sp>
         <p:nvSpPr>
-          <p:cNvPr id="1798426719" name="Text">
-    </p:cNvPr>
-          <p:cNvSpPr>
-            <a:spLocks noGrp="1"/>
-          </p:cNvSpPr>
-          <p:nvPr/>
-        </p:nvSpPr>
-        <p:spPr>
-          <a:xfrm rot="0">
-            <a:off x="5664200" y="838200"/>
-            <a:ext cx="4673600" cy="381000"/>
+          <p:cNvPr id="612896193" name="Text">
+    </p:cNvPr>
+          <p:cNvSpPr>
+            <a:spLocks noGrp="1"/>
+          </p:cNvSpPr>
+          <p:nvPr/>
+        </p:nvSpPr>
+        <p:spPr>
+          <a:xfrm rot="0">
+            <a:off x="5219700" y="825500"/>
+            <a:ext cx="4660900" cy="381000"/>
           </a:xfrm>
           <a:prstGeom prst="rect">
             <a:avLst/>
@@ -3059,17 +3059,17 @@
       </p:sp>
       <p:sp>
         <p:nvSpPr>
-          <p:cNvPr id="625903718" name="Text">
-    </p:cNvPr>
-          <p:cNvSpPr>
-            <a:spLocks noGrp="1"/>
-          </p:cNvSpPr>
-          <p:nvPr/>
-        </p:nvSpPr>
-        <p:spPr>
-          <a:xfrm rot="0">
-            <a:off x="114300" y="838200"/>
-            <a:ext cx="5245100" cy="381000"/>
+          <p:cNvPr id="2016092959" name="Text">
+    </p:cNvPr>
+          <p:cNvSpPr>
+            <a:spLocks noGrp="1"/>
+          </p:cNvSpPr>
+          <p:nvPr/>
+        </p:nvSpPr>
+        <p:spPr>
+          <a:xfrm rot="0">
+            <a:off x="88900" y="825500"/>
+            <a:ext cx="5067300" cy="381000"/>
           </a:xfrm>
           <a:prstGeom prst="rect">
             <a:avLst/>
@@ -3108,17 +3108,17 @@
       </p:sp>
       <p:sp>
         <p:nvSpPr>
-          <p:cNvPr id="924941734" name="Text">
-    </p:cNvPr>
-          <p:cNvSpPr>
-            <a:spLocks noGrp="1"/>
-          </p:cNvSpPr>
-          <p:nvPr/>
-        </p:nvSpPr>
-        <p:spPr>
-          <a:xfrm rot="0">
-            <a:off x="139700" y="800100"/>
-            <a:ext cx="5168900" cy="381000"/>
+          <p:cNvPr id="546100260" name="Text">
+    </p:cNvPr>
+          <p:cNvSpPr>
+            <a:spLocks noGrp="1"/>
+          </p:cNvSpPr>
+          <p:nvPr/>
+        </p:nvSpPr>
+        <p:spPr>
+          <a:xfrm rot="0">
+            <a:off x="63500" y="800100"/>
+            <a:ext cx="5054600" cy="381000"/>
           </a:xfrm>
           <a:prstGeom prst="rect">
             <a:avLst/>
@@ -3157,17 +3157,17 @@
       </p:sp>
       <p:sp>
         <p:nvSpPr>
-          <p:cNvPr id="1589246091" name="Text">
-    </p:cNvPr>
-          <p:cNvSpPr>
-            <a:spLocks noGrp="1"/>
-          </p:cNvSpPr>
-          <p:nvPr/>
-        </p:nvSpPr>
-        <p:spPr>
-          <a:xfrm rot="0">
-            <a:off x="5664200" y="800100"/>
-            <a:ext cx="4622800" cy="381000"/>
+          <p:cNvPr id="1261886305" name="Text">
+    </p:cNvPr>
+          <p:cNvSpPr>
+            <a:spLocks noGrp="1"/>
+          </p:cNvSpPr>
+          <p:nvPr/>
+        </p:nvSpPr>
+        <p:spPr>
+          <a:xfrm rot="0">
+            <a:off x="5232400" y="800100"/>
+            <a:ext cx="4610100" cy="381000"/>
           </a:xfrm>
           <a:prstGeom prst="rect">
             <a:avLst/>
@@ -3206,7 +3206,7 @@
       </p:sp>
       <p:sp>
         <p:nvSpPr>
-          <p:cNvPr id="1005549611" name="Text">
+          <p:cNvPr id="800338371" name="Text">
     </p:cNvPr>
           <p:cNvSpPr>
             <a:spLocks noGrp="1"/>
@@ -3252,7 +3252,7 @@
       </p:sp>
       <p:sp>
         <p:nvSpPr>
-          <p:cNvPr id="1790167688" name="Text">
+          <p:cNvPr id="237427953" name="Text">
     </p:cNvPr>
           <p:cNvSpPr>
             <a:spLocks noGrp="1"/>
@@ -3316,7 +3316,7 @@
       </p:sp>
       <p:sp>
         <p:nvSpPr>
-          <p:cNvPr id="1455638069" name="Text">
+          <p:cNvPr id="1213011173" name="Text">
     </p:cNvPr>
           <p:cNvSpPr>
             <a:spLocks noGrp="1"/>
@@ -3326,7 +3326,7 @@
         <p:spPr>
           <a:xfrm rot="0">
             <a:off x="647700" y="1295400"/>
-            <a:ext cx="3340100" cy="469900"/>
+            <a:ext cx="3111500" cy="469900"/>
           </a:xfrm>
           <a:prstGeom prst="rect">
             <a:avLst/>
@@ -3371,17 +3371,17 @@
       </p:sp>
       <p:sp>
         <p:nvSpPr>
-          <p:cNvPr id="1202684358" name="Text">
-    </p:cNvPr>
-          <p:cNvSpPr>
-            <a:spLocks noGrp="1"/>
-          </p:cNvSpPr>
-          <p:nvPr/>
-        </p:nvSpPr>
-        <p:spPr>
-          <a:xfrm rot="0">
-            <a:off x="3987800" y="1295400"/>
-            <a:ext cx="520700" cy="469900"/>
+          <p:cNvPr id="895300446" name="Text">
+    </p:cNvPr>
+          <p:cNvSpPr>
+            <a:spLocks noGrp="1"/>
+          </p:cNvSpPr>
+          <p:nvPr/>
+        </p:nvSpPr>
+        <p:spPr>
+          <a:xfrm rot="0">
+            <a:off x="3759200" y="1295400"/>
+            <a:ext cx="457200" cy="469900"/>
           </a:xfrm>
           <a:prstGeom prst="rect">
             <a:avLst/>
@@ -3426,17 +3426,17 @@
       </p:sp>
       <p:sp>
         <p:nvSpPr>
-          <p:cNvPr id="130127672" name="Text">
-    </p:cNvPr>
-          <p:cNvSpPr>
-            <a:spLocks noGrp="1"/>
-          </p:cNvSpPr>
-          <p:nvPr/>
-        </p:nvSpPr>
-        <p:spPr>
-          <a:xfrm rot="0">
-            <a:off x="4508500" y="1295400"/>
-            <a:ext cx="495300" cy="469900"/>
+          <p:cNvPr id="1005135391" name="Text">
+    </p:cNvPr>
+          <p:cNvSpPr>
+            <a:spLocks noGrp="1"/>
+          </p:cNvSpPr>
+          <p:nvPr/>
+        </p:nvSpPr>
+        <p:spPr>
+          <a:xfrm rot="0">
+            <a:off x="4216400" y="1295400"/>
+            <a:ext cx="457200" cy="469900"/>
           </a:xfrm>
           <a:prstGeom prst="rect">
             <a:avLst/>
@@ -3490,16 +3490,16 @@
       </p:sp>
       <p:sp>
         <p:nvSpPr>
-          <p:cNvPr id="1943202498" name="Text">
-    </p:cNvPr>
-          <p:cNvSpPr>
-            <a:spLocks noGrp="1"/>
-          </p:cNvSpPr>
-          <p:nvPr/>
-        </p:nvSpPr>
-        <p:spPr>
-          <a:xfrm rot="0">
-            <a:off x="5575300" y="1295400"/>
+          <p:cNvPr id="59811015" name="Text">
+    </p:cNvPr>
+          <p:cNvSpPr>
+            <a:spLocks noGrp="1"/>
+          </p:cNvSpPr>
+          <p:nvPr/>
+        </p:nvSpPr>
+        <p:spPr>
+          <a:xfrm rot="0">
+            <a:off x="5207000" y="1295400"/>
             <a:ext cx="609600" cy="469900"/>
           </a:xfrm>
           <a:prstGeom prst="rect">
@@ -3554,17 +3554,17 @@
       </p:sp>
       <p:sp>
         <p:nvSpPr>
-          <p:cNvPr id="1072494691" name="Text">
-    </p:cNvPr>
-          <p:cNvSpPr>
-            <a:spLocks noGrp="1"/>
-          </p:cNvSpPr>
-          <p:nvPr/>
-        </p:nvSpPr>
-        <p:spPr>
-          <a:xfrm rot="0">
-            <a:off x="6184900" y="1295400"/>
-            <a:ext cx="3213100" cy="469900"/>
+          <p:cNvPr id="601518700" name="Text">
+    </p:cNvPr>
+          <p:cNvSpPr>
+            <a:spLocks noGrp="1"/>
+          </p:cNvSpPr>
+          <p:nvPr/>
+        </p:nvSpPr>
+        <p:spPr>
+          <a:xfrm rot="0">
+            <a:off x="5816600" y="1295400"/>
+            <a:ext cx="3111500" cy="469900"/>
           </a:xfrm>
           <a:prstGeom prst="rect">
             <a:avLst/>
@@ -3609,17 +3609,17 @@
       </p:sp>
       <p:sp>
         <p:nvSpPr>
-          <p:cNvPr id="83296233" name="Text">
-    </p:cNvPr>
-          <p:cNvSpPr>
-            <a:spLocks noGrp="1"/>
-          </p:cNvSpPr>
-          <p:nvPr/>
-        </p:nvSpPr>
-        <p:spPr>
-          <a:xfrm rot="0">
-            <a:off x="9398000" y="1295400"/>
-            <a:ext cx="495300" cy="469900"/>
+          <p:cNvPr id="2143380106" name="Text">
+    </p:cNvPr>
+          <p:cNvSpPr>
+            <a:spLocks noGrp="1"/>
+          </p:cNvSpPr>
+          <p:nvPr/>
+        </p:nvSpPr>
+        <p:spPr>
+          <a:xfrm rot="0">
+            <a:off x="8928100" y="1295400"/>
+            <a:ext cx="457200" cy="469900"/>
           </a:xfrm>
           <a:prstGeom prst="rect">
             <a:avLst/>
@@ -3664,16 +3664,16 @@
       </p:sp>
       <p:sp>
         <p:nvSpPr>
-          <p:cNvPr id="252039192" name="Text">
-    </p:cNvPr>
-          <p:cNvSpPr>
-            <a:spLocks noGrp="1"/>
-          </p:cNvSpPr>
-          <p:nvPr/>
-        </p:nvSpPr>
-        <p:spPr>
-          <a:xfrm rot="0">
-            <a:off x="5003800" y="1295400"/>
+          <p:cNvPr id="233466547" name="Text">
+    </p:cNvPr>
+          <p:cNvSpPr>
+            <a:spLocks noGrp="1"/>
+          </p:cNvSpPr>
+          <p:nvPr/>
+        </p:nvSpPr>
+        <p:spPr>
+          <a:xfrm rot="0">
+            <a:off x="4673600" y="1295400"/>
             <a:ext cx="469900" cy="469900"/>
           </a:xfrm>
           <a:prstGeom prst="rect">
@@ -3728,17 +3728,17 @@
       </p:sp>
       <p:sp>
         <p:nvSpPr>
-          <p:cNvPr id="1801830336" name="Text">
-    </p:cNvPr>
-          <p:cNvSpPr>
-            <a:spLocks noGrp="1"/>
-          </p:cNvSpPr>
-          <p:nvPr/>
-        </p:nvSpPr>
-        <p:spPr>
-          <a:xfrm rot="0">
-            <a:off x="9893300" y="1295400"/>
-            <a:ext cx="469900" cy="469900"/>
+          <p:cNvPr id="198857045" name="Text">
+    </p:cNvPr>
+          <p:cNvSpPr>
+            <a:spLocks noGrp="1"/>
+          </p:cNvSpPr>
+          <p:nvPr/>
+        </p:nvSpPr>
+        <p:spPr>
+          <a:xfrm rot="0">
+            <a:off x="9385300" y="1295400"/>
+            <a:ext cx="457200" cy="469900"/>
           </a:xfrm>
           <a:prstGeom prst="rect">
             <a:avLst/>
@@ -3792,17 +3792,17 @@
       </p:sp>
       <p:sp>
         <p:nvSpPr>
-          <p:cNvPr id="865238319" name="Text">
-    </p:cNvPr>
-          <p:cNvSpPr>
-            <a:spLocks noGrp="1"/>
-          </p:cNvSpPr>
-          <p:nvPr/>
-        </p:nvSpPr>
-        <p:spPr>
-          <a:xfrm rot="0">
-            <a:off x="9893300" y="1765300"/>
-            <a:ext cx="469900" cy="2425700"/>
+          <p:cNvPr id="2078477136" name="Text">
+    </p:cNvPr>
+          <p:cNvSpPr>
+            <a:spLocks noGrp="1"/>
+          </p:cNvSpPr>
+          <p:nvPr/>
+        </p:nvSpPr>
+        <p:spPr>
+          <a:xfrm rot="0">
+            <a:off x="9385300" y="1765300"/>
+            <a:ext cx="457200" cy="2425700"/>
           </a:xfrm>
           <a:prstGeom prst="rect">
             <a:avLst/>
@@ -3864,17 +3864,17 @@
       </p:sp>
       <p:sp>
         <p:nvSpPr>
-          <p:cNvPr id="2675971" name="Text">
-    </p:cNvPr>
-          <p:cNvSpPr>
-            <a:spLocks noGrp="1"/>
-          </p:cNvSpPr>
-          <p:nvPr/>
-        </p:nvSpPr>
-        <p:spPr>
-          <a:xfrm rot="0">
-            <a:off x="9398000" y="1765300"/>
-            <a:ext cx="495300" cy="2425700"/>
+          <p:cNvPr id="256041876" name="Text">
+    </p:cNvPr>
+          <p:cNvSpPr>
+            <a:spLocks noGrp="1"/>
+          </p:cNvSpPr>
+          <p:nvPr/>
+        </p:nvSpPr>
+        <p:spPr>
+          <a:xfrm rot="0">
+            <a:off x="8928100" y="1765300"/>
+            <a:ext cx="457200" cy="2425700"/>
           </a:xfrm>
           <a:prstGeom prst="rect">
             <a:avLst/>
@@ -3936,17 +3936,17 @@
       </p:sp>
       <p:sp>
         <p:nvSpPr>
-          <p:cNvPr id="554450958" name="Text">
-    </p:cNvPr>
-          <p:cNvSpPr>
-            <a:spLocks noGrp="1"/>
-          </p:cNvSpPr>
-          <p:nvPr/>
-        </p:nvSpPr>
-        <p:spPr>
-          <a:xfrm rot="0">
-            <a:off x="6273800" y="1765300"/>
-            <a:ext cx="3111500" cy="2425700"/>
+          <p:cNvPr id="1361293117" name="Text">
+    </p:cNvPr>
+          <p:cNvSpPr>
+            <a:spLocks noGrp="1"/>
+          </p:cNvSpPr>
+          <p:nvPr/>
+        </p:nvSpPr>
+        <p:spPr>
+          <a:xfrm rot="0">
+            <a:off x="5930900" y="1765300"/>
+            <a:ext cx="2984500" cy="2425700"/>
           </a:xfrm>
           <a:prstGeom prst="rect">
             <a:avLst/>
@@ -4010,16 +4010,16 @@
       </p:sp>
       <p:sp>
         <p:nvSpPr>
-          <p:cNvPr id="1741779024" name="Text">
-    </p:cNvPr>
-          <p:cNvSpPr>
-            <a:spLocks noGrp="1"/>
-          </p:cNvSpPr>
-          <p:nvPr/>
-        </p:nvSpPr>
-        <p:spPr>
-          <a:xfrm rot="0">
-            <a:off x="5575300" y="1765300"/>
+          <p:cNvPr id="145366197" name="Text">
+    </p:cNvPr>
+          <p:cNvSpPr>
+            <a:spLocks noGrp="1"/>
+          </p:cNvSpPr>
+          <p:nvPr/>
+        </p:nvSpPr>
+        <p:spPr>
+          <a:xfrm rot="0">
+            <a:off x="5207000" y="1765300"/>
             <a:ext cx="609600" cy="2425700"/>
           </a:xfrm>
           <a:prstGeom prst="rect">
@@ -4090,7 +4090,7 @@
       </p:sp>
       <p:sp>
         <p:nvSpPr>
-          <p:cNvPr id="1200231040" name="Text">
+          <p:cNvPr id="1802514299" name="Text">
     </p:cNvPr>
           <p:cNvSpPr>
             <a:spLocks noGrp="1"/>
@@ -4170,17 +4170,17 @@
       </p:sp>
       <p:sp>
         <p:nvSpPr>
-          <p:cNvPr id="21776319" name="Text">
-    </p:cNvPr>
-          <p:cNvSpPr>
-            <a:spLocks noGrp="1"/>
-          </p:cNvSpPr>
-          <p:nvPr/>
-        </p:nvSpPr>
-        <p:spPr>
-          <a:xfrm rot="0">
-            <a:off x="723900" y="1765300"/>
-            <a:ext cx="3251200" cy="2425700"/>
+          <p:cNvPr id="1932935106" name="Text">
+    </p:cNvPr>
+          <p:cNvSpPr>
+            <a:spLocks noGrp="1"/>
+          </p:cNvSpPr>
+          <p:nvPr/>
+        </p:nvSpPr>
+        <p:spPr>
+          <a:xfrm rot="0">
+            <a:off x="762000" y="1765300"/>
+            <a:ext cx="2984500" cy="2425700"/>
           </a:xfrm>
           <a:prstGeom prst="rect">
             <a:avLst/>
@@ -4289,17 +4289,17 @@
       </p:sp>
       <p:sp>
         <p:nvSpPr>
-          <p:cNvPr id="1115909032" name="Text">
-    </p:cNvPr>
-          <p:cNvSpPr>
-            <a:spLocks noGrp="1"/>
-          </p:cNvSpPr>
-          <p:nvPr/>
-        </p:nvSpPr>
-        <p:spPr>
-          <a:xfrm rot="0">
-            <a:off x="4508500" y="1765300"/>
-            <a:ext cx="495300" cy="2425700"/>
+          <p:cNvPr id="223748177" name="Text">
+    </p:cNvPr>
+          <p:cNvSpPr>
+            <a:spLocks noGrp="1"/>
+          </p:cNvSpPr>
+          <p:nvPr/>
+        </p:nvSpPr>
+        <p:spPr>
+          <a:xfrm rot="0">
+            <a:off x="4216400" y="1765300"/>
+            <a:ext cx="457200" cy="2425700"/>
           </a:xfrm>
           <a:prstGeom prst="rect">
             <a:avLst/>
@@ -4390,16 +4390,16 @@
       </p:sp>
       <p:sp>
         <p:nvSpPr>
-          <p:cNvPr id="784121944" name="Text">
-    </p:cNvPr>
-          <p:cNvSpPr>
-            <a:spLocks noGrp="1"/>
-          </p:cNvSpPr>
-          <p:nvPr/>
-        </p:nvSpPr>
-        <p:spPr>
-          <a:xfrm rot="0">
-            <a:off x="5003800" y="1765300"/>
+          <p:cNvPr id="1331480086" name="Text">
+    </p:cNvPr>
+          <p:cNvSpPr>
+            <a:spLocks noGrp="1"/>
+          </p:cNvSpPr>
+          <p:nvPr/>
+        </p:nvSpPr>
+        <p:spPr>
+          <a:xfrm rot="0">
+            <a:off x="4673600" y="1765300"/>
             <a:ext cx="469900" cy="2425700"/>
           </a:xfrm>
           <a:prstGeom prst="rect">
@@ -4491,17 +4491,17 @@
       </p:sp>
       <p:sp>
         <p:nvSpPr>
-          <p:cNvPr id="959826205" name="Text">
-    </p:cNvPr>
-          <p:cNvSpPr>
-            <a:spLocks noGrp="1"/>
-          </p:cNvSpPr>
-          <p:nvPr/>
-        </p:nvSpPr>
-        <p:spPr>
-          <a:xfrm rot="0">
-            <a:off x="3987800" y="1765300"/>
-            <a:ext cx="520700" cy="2425700"/>
+          <p:cNvPr id="1898235391" name="Text">
+    </p:cNvPr>
+          <p:cNvSpPr>
+            <a:spLocks noGrp="1"/>
+          </p:cNvSpPr>
+          <p:nvPr/>
+        </p:nvSpPr>
+        <p:spPr>
+          <a:xfrm rot="0">
+            <a:off x="3759200" y="1765300"/>
+            <a:ext cx="457200" cy="2425700"/>
           </a:xfrm>
           <a:prstGeom prst="rect">
             <a:avLst/>
@@ -4592,7 +4592,7 @@
       </p:sp>
       <p:sp>
         <p:nvSpPr>
-          <p:cNvPr id="1520898107" name="Text">
+          <p:cNvPr id="684451176" name="Text">
     </p:cNvPr>
           <p:cNvSpPr>
             <a:spLocks noGrp="1"/>
@@ -4602,7 +4602,7 @@
         <p:spPr>
           <a:xfrm rot="0">
             <a:off x="647700" y="1765300"/>
-            <a:ext cx="3340100" cy="2425700"/>
+            <a:ext cx="3111500" cy="2425700"/>
           </a:xfrm>
           <a:prstGeom prst="rect">
             <a:avLst/>
@@ -4644,17 +4644,17 @@
       </p:sp>
       <p:sp>
         <p:nvSpPr>
-          <p:cNvPr id="52489964" name="Text">
-    </p:cNvPr>
-          <p:cNvSpPr>
-            <a:spLocks noGrp="1"/>
-          </p:cNvSpPr>
-          <p:nvPr/>
-        </p:nvSpPr>
-        <p:spPr>
-          <a:xfrm rot="0">
-            <a:off x="6184900" y="1765300"/>
-            <a:ext cx="3213100" cy="2425700"/>
+          <p:cNvPr id="337845384" name="Text">
+    </p:cNvPr>
+          <p:cNvSpPr>
+            <a:spLocks noGrp="1"/>
+          </p:cNvSpPr>
+          <p:nvPr/>
+        </p:nvSpPr>
+        <p:spPr>
+          <a:xfrm rot="0">
+            <a:off x="5816600" y="1765300"/>
+            <a:ext cx="3111500" cy="2425700"/>
           </a:xfrm>
           <a:prstGeom prst="rect">
             <a:avLst/>
@@ -4696,17 +4696,17 @@
       </p:sp>
       <p:sp>
         <p:nvSpPr>
-          <p:cNvPr id="1263947984" name="Text">
-    </p:cNvPr>
-          <p:cNvSpPr>
-            <a:spLocks noGrp="1"/>
-          </p:cNvSpPr>
-          <p:nvPr/>
-        </p:nvSpPr>
-        <p:spPr>
-          <a:xfrm rot="0">
-            <a:off x="9893300" y="4267200"/>
-            <a:ext cx="469900" cy="1524000"/>
+          <p:cNvPr id="1030100076" name="Text">
+    </p:cNvPr>
+          <p:cNvSpPr>
+            <a:spLocks noGrp="1"/>
+          </p:cNvSpPr>
+          <p:nvPr/>
+        </p:nvSpPr>
+        <p:spPr>
+          <a:xfrm rot="0">
+            <a:off x="9385300" y="4191000"/>
+            <a:ext cx="457200" cy="1524000"/>
           </a:xfrm>
           <a:prstGeom prst="rect">
             <a:avLst/>
@@ -4769,17 +4769,17 @@
       </p:sp>
       <p:sp>
         <p:nvSpPr>
-          <p:cNvPr id="1547441542" name="Text">
-    </p:cNvPr>
-          <p:cNvSpPr>
-            <a:spLocks noGrp="1"/>
-          </p:cNvSpPr>
-          <p:nvPr/>
-        </p:nvSpPr>
-        <p:spPr>
-          <a:xfrm rot="0">
-            <a:off x="9398000" y="4267200"/>
-            <a:ext cx="495300" cy="1524000"/>
+          <p:cNvPr id="1782199554" name="Text">
+    </p:cNvPr>
+          <p:cNvSpPr>
+            <a:spLocks noGrp="1"/>
+          </p:cNvSpPr>
+          <p:nvPr/>
+        </p:nvSpPr>
+        <p:spPr>
+          <a:xfrm rot="0">
+            <a:off x="8928100" y="4191000"/>
+            <a:ext cx="457200" cy="1524000"/>
           </a:xfrm>
           <a:prstGeom prst="rect">
             <a:avLst/>
@@ -4842,17 +4842,17 @@
       </p:sp>
       <p:sp>
         <p:nvSpPr>
-          <p:cNvPr id="1048109298" name="Text">
-    </p:cNvPr>
-          <p:cNvSpPr>
-            <a:spLocks noGrp="1"/>
-          </p:cNvSpPr>
-          <p:nvPr/>
-        </p:nvSpPr>
-        <p:spPr>
-          <a:xfrm rot="0">
-            <a:off x="6273800" y="4267200"/>
-            <a:ext cx="3111500" cy="1524000"/>
+          <p:cNvPr id="497905032" name="Text">
+    </p:cNvPr>
+          <p:cNvSpPr>
+            <a:spLocks noGrp="1"/>
+          </p:cNvSpPr>
+          <p:nvPr/>
+        </p:nvSpPr>
+        <p:spPr>
+          <a:xfrm rot="0">
+            <a:off x="5930900" y="4191000"/>
+            <a:ext cx="2984500" cy="1524000"/>
           </a:xfrm>
           <a:prstGeom prst="rect">
             <a:avLst/>
@@ -4925,16 +4925,16 @@
       </p:sp>
       <p:sp>
         <p:nvSpPr>
-          <p:cNvPr id="975908447" name="Text">
-    </p:cNvPr>
-          <p:cNvSpPr>
-            <a:spLocks noGrp="1"/>
-          </p:cNvSpPr>
-          <p:nvPr/>
-        </p:nvSpPr>
-        <p:spPr>
-          <a:xfrm rot="0">
-            <a:off x="5575300" y="4267200"/>
+          <p:cNvPr id="300344809" name="Text">
+    </p:cNvPr>
+          <p:cNvSpPr>
+            <a:spLocks noGrp="1"/>
+          </p:cNvSpPr>
+          <p:nvPr/>
+        </p:nvSpPr>
+        <p:spPr>
+          <a:xfrm rot="0">
+            <a:off x="5207000" y="4191000"/>
             <a:ext cx="609600" cy="1524000"/>
           </a:xfrm>
           <a:prstGeom prst="rect">
@@ -5005,16 +5005,16 @@
       </p:sp>
       <p:sp>
         <p:nvSpPr>
-          <p:cNvPr id="1132607770" name="Text">
-    </p:cNvPr>
-          <p:cNvSpPr>
-            <a:spLocks noGrp="1"/>
-          </p:cNvSpPr>
-          <p:nvPr/>
-        </p:nvSpPr>
-        <p:spPr>
-          <a:xfrm rot="0">
-            <a:off x="38100" y="4267200"/>
+          <p:cNvPr id="481187533" name="Text">
+    </p:cNvPr>
+          <p:cNvSpPr>
+            <a:spLocks noGrp="1"/>
+          </p:cNvSpPr>
+          <p:nvPr/>
+        </p:nvSpPr>
+        <p:spPr>
+          <a:xfrm rot="0">
+            <a:off x="38100" y="4191000"/>
             <a:ext cx="609600" cy="1524000"/>
           </a:xfrm>
           <a:prstGeom prst="rect">
@@ -5085,17 +5085,17 @@
       </p:sp>
       <p:sp>
         <p:nvSpPr>
-          <p:cNvPr id="2133759177" name="Text">
-    </p:cNvPr>
-          <p:cNvSpPr>
-            <a:spLocks noGrp="1"/>
-          </p:cNvSpPr>
-          <p:nvPr/>
-        </p:nvSpPr>
-        <p:spPr>
-          <a:xfrm rot="0">
-            <a:off x="723900" y="4267200"/>
-            <a:ext cx="3251200" cy="1524000"/>
+          <p:cNvPr id="654832255" name="Text">
+    </p:cNvPr>
+          <p:cNvSpPr>
+            <a:spLocks noGrp="1"/>
+          </p:cNvSpPr>
+          <p:nvPr/>
+        </p:nvSpPr>
+        <p:spPr>
+          <a:xfrm rot="0">
+            <a:off x="762000" y="4191000"/>
+            <a:ext cx="2984500" cy="1524000"/>
           </a:xfrm>
           <a:prstGeom prst="rect">
             <a:avLst/>
@@ -5177,17 +5177,17 @@
       </p:sp>
       <p:sp>
         <p:nvSpPr>
-          <p:cNvPr id="103318702" name="Text">
-    </p:cNvPr>
-          <p:cNvSpPr>
-            <a:spLocks noGrp="1"/>
-          </p:cNvSpPr>
-          <p:nvPr/>
-        </p:nvSpPr>
-        <p:spPr>
-          <a:xfrm rot="0">
-            <a:off x="4508500" y="4267200"/>
-            <a:ext cx="495300" cy="1524000"/>
+          <p:cNvPr id="1362102842" name="Text">
+    </p:cNvPr>
+          <p:cNvSpPr>
+            <a:spLocks noGrp="1"/>
+          </p:cNvSpPr>
+          <p:nvPr/>
+        </p:nvSpPr>
+        <p:spPr>
+          <a:xfrm rot="0">
+            <a:off x="4216400" y="4191000"/>
+            <a:ext cx="457200" cy="1524000"/>
           </a:xfrm>
           <a:prstGeom prst="rect">
             <a:avLst/>
@@ -5259,16 +5259,16 @@
       </p:sp>
       <p:sp>
         <p:nvSpPr>
-          <p:cNvPr id="1704074210" name="Text">
-    </p:cNvPr>
-          <p:cNvSpPr>
-            <a:spLocks noGrp="1"/>
-          </p:cNvSpPr>
-          <p:nvPr/>
-        </p:nvSpPr>
-        <p:spPr>
-          <a:xfrm rot="0">
-            <a:off x="5003800" y="4267200"/>
+          <p:cNvPr id="2011128920" name="Text">
+    </p:cNvPr>
+          <p:cNvSpPr>
+            <a:spLocks noGrp="1"/>
+          </p:cNvSpPr>
+          <p:nvPr/>
+        </p:nvSpPr>
+        <p:spPr>
+          <a:xfrm rot="0">
+            <a:off x="4673600" y="4191000"/>
             <a:ext cx="469900" cy="1524000"/>
           </a:xfrm>
           <a:prstGeom prst="rect">
@@ -5341,17 +5341,17 @@
       </p:sp>
       <p:sp>
         <p:nvSpPr>
-          <p:cNvPr id="923448483" name="Text">
-    </p:cNvPr>
-          <p:cNvSpPr>
-            <a:spLocks noGrp="1"/>
-          </p:cNvSpPr>
-          <p:nvPr/>
-        </p:nvSpPr>
-        <p:spPr>
-          <a:xfrm rot="0">
-            <a:off x="3987800" y="4267200"/>
-            <a:ext cx="520700" cy="1524000"/>
+          <p:cNvPr id="422136912" name="Text">
+    </p:cNvPr>
+          <p:cNvSpPr>
+            <a:spLocks noGrp="1"/>
+          </p:cNvSpPr>
+          <p:nvPr/>
+        </p:nvSpPr>
+        <p:spPr>
+          <a:xfrm rot="0">
+            <a:off x="3759200" y="4191000"/>
+            <a:ext cx="457200" cy="1524000"/>
           </a:xfrm>
           <a:prstGeom prst="rect">
             <a:avLst/>
@@ -5423,17 +5423,17 @@
       </p:sp>
       <p:sp>
         <p:nvSpPr>
-          <p:cNvPr id="1007285847" name="Text">
-    </p:cNvPr>
-          <p:cNvSpPr>
-            <a:spLocks noGrp="1"/>
-          </p:cNvSpPr>
-          <p:nvPr/>
-        </p:nvSpPr>
-        <p:spPr>
-          <a:xfrm rot="0">
-            <a:off x="647700" y="4267200"/>
-            <a:ext cx="3340100" cy="1524000"/>
+          <p:cNvPr id="19251456" name="Text">
+    </p:cNvPr>
+          <p:cNvSpPr>
+            <a:spLocks noGrp="1"/>
+          </p:cNvSpPr>
+          <p:nvPr/>
+        </p:nvSpPr>
+        <p:spPr>
+          <a:xfrm rot="0">
+            <a:off x="647700" y="4191000"/>
+            <a:ext cx="3111500" cy="1524000"/>
           </a:xfrm>
           <a:prstGeom prst="rect">
             <a:avLst/>
@@ -5475,17 +5475,17 @@
       </p:sp>
       <p:sp>
         <p:nvSpPr>
-          <p:cNvPr id="2126907532" name="Text">
-    </p:cNvPr>
-          <p:cNvSpPr>
-            <a:spLocks noGrp="1"/>
-          </p:cNvSpPr>
-          <p:nvPr/>
-        </p:nvSpPr>
-        <p:spPr>
-          <a:xfrm rot="0">
-            <a:off x="6184900" y="4267200"/>
-            <a:ext cx="3213100" cy="1524000"/>
+          <p:cNvPr id="1351973572" name="Text">
+    </p:cNvPr>
+          <p:cNvSpPr>
+            <a:spLocks noGrp="1"/>
+          </p:cNvSpPr>
+          <p:nvPr/>
+        </p:nvSpPr>
+        <p:spPr>
+          <a:xfrm rot="0">
+            <a:off x="5816600" y="4191000"/>
+            <a:ext cx="3111500" cy="1524000"/>
           </a:xfrm>
           <a:prstGeom prst="rect">
             <a:avLst/>
@@ -5552,17 +5552,17 @@
       </p:grpSpPr>
       <p:sp>
         <p:nvSpPr>
-          <p:cNvPr id="192827837" name="Text">
-    </p:cNvPr>
-          <p:cNvSpPr>
-            <a:spLocks noGrp="1"/>
-          </p:cNvSpPr>
-          <p:nvPr/>
-        </p:nvSpPr>
-        <p:spPr>
-          <a:xfrm rot="0">
-            <a:off x="5664200" y="838200"/>
-            <a:ext cx="4673600" cy="381000"/>
+          <p:cNvPr id="1558460714" name="Text">
+    </p:cNvPr>
+          <p:cNvSpPr>
+            <a:spLocks noGrp="1"/>
+          </p:cNvSpPr>
+          <p:nvPr/>
+        </p:nvSpPr>
+        <p:spPr>
+          <a:xfrm rot="0">
+            <a:off x="5219700" y="825500"/>
+            <a:ext cx="4660900" cy="381000"/>
           </a:xfrm>
           <a:prstGeom prst="rect">
             <a:avLst/>
@@ -5601,17 +5601,17 @@
       </p:sp>
       <p:sp>
         <p:nvSpPr>
-          <p:cNvPr id="1764971485" name="Text">
-    </p:cNvPr>
-          <p:cNvSpPr>
-            <a:spLocks noGrp="1"/>
-          </p:cNvSpPr>
-          <p:nvPr/>
-        </p:nvSpPr>
-        <p:spPr>
-          <a:xfrm rot="0">
-            <a:off x="114300" y="838200"/>
-            <a:ext cx="5245100" cy="381000"/>
+          <p:cNvPr id="259831082" name="Text">
+    </p:cNvPr>
+          <p:cNvSpPr>
+            <a:spLocks noGrp="1"/>
+          </p:cNvSpPr>
+          <p:nvPr/>
+        </p:nvSpPr>
+        <p:spPr>
+          <a:xfrm rot="0">
+            <a:off x="88900" y="825500"/>
+            <a:ext cx="5067300" cy="381000"/>
           </a:xfrm>
           <a:prstGeom prst="rect">
             <a:avLst/>
@@ -5650,17 +5650,17 @@
       </p:sp>
       <p:sp>
         <p:nvSpPr>
-          <p:cNvPr id="452705250" name="Text">
-    </p:cNvPr>
-          <p:cNvSpPr>
-            <a:spLocks noGrp="1"/>
-          </p:cNvSpPr>
-          <p:nvPr/>
-        </p:nvSpPr>
-        <p:spPr>
-          <a:xfrm rot="0">
-            <a:off x="139700" y="800100"/>
-            <a:ext cx="5168900" cy="381000"/>
+          <p:cNvPr id="545146884" name="Text">
+    </p:cNvPr>
+          <p:cNvSpPr>
+            <a:spLocks noGrp="1"/>
+          </p:cNvSpPr>
+          <p:nvPr/>
+        </p:nvSpPr>
+        <p:spPr>
+          <a:xfrm rot="0">
+            <a:off x="63500" y="800100"/>
+            <a:ext cx="5054600" cy="381000"/>
           </a:xfrm>
           <a:prstGeom prst="rect">
             <a:avLst/>
@@ -5699,17 +5699,17 @@
       </p:sp>
       <p:sp>
         <p:nvSpPr>
-          <p:cNvPr id="1421296217" name="Text">
-    </p:cNvPr>
-          <p:cNvSpPr>
-            <a:spLocks noGrp="1"/>
-          </p:cNvSpPr>
-          <p:nvPr/>
-        </p:nvSpPr>
-        <p:spPr>
-          <a:xfrm rot="0">
-            <a:off x="5664200" y="800100"/>
-            <a:ext cx="4622800" cy="381000"/>
+          <p:cNvPr id="1531331989" name="Text">
+    </p:cNvPr>
+          <p:cNvSpPr>
+            <a:spLocks noGrp="1"/>
+          </p:cNvSpPr>
+          <p:nvPr/>
+        </p:nvSpPr>
+        <p:spPr>
+          <a:xfrm rot="0">
+            <a:off x="5232400" y="800100"/>
+            <a:ext cx="4610100" cy="381000"/>
           </a:xfrm>
           <a:prstGeom prst="rect">
             <a:avLst/>
@@ -5748,7 +5748,7 @@
       </p:sp>
       <p:sp>
         <p:nvSpPr>
-          <p:cNvPr id="767361739" name="Text">
+          <p:cNvPr id="638982846" name="Text">
     </p:cNvPr>
           <p:cNvSpPr>
             <a:spLocks noGrp="1"/>
@@ -5794,7 +5794,7 @@
       </p:sp>
       <p:sp>
         <p:nvSpPr>
-          <p:cNvPr id="1583546650" name="Text">
+          <p:cNvPr id="1286160051" name="Text">
     </p:cNvPr>
           <p:cNvSpPr>
             <a:spLocks noGrp="1"/>
@@ -5858,7 +5858,7 @@
       </p:sp>
       <p:sp>
         <p:nvSpPr>
-          <p:cNvPr id="419468703" name="Text">
+          <p:cNvPr id="516256074" name="Text">
     </p:cNvPr>
           <p:cNvSpPr>
             <a:spLocks noGrp="1"/>
@@ -5868,7 +5868,7 @@
         <p:spPr>
           <a:xfrm rot="0">
             <a:off x="647700" y="1295400"/>
-            <a:ext cx="3340100" cy="469900"/>
+            <a:ext cx="3111500" cy="469900"/>
           </a:xfrm>
           <a:prstGeom prst="rect">
             <a:avLst/>
@@ -5913,17 +5913,17 @@
       </p:sp>
       <p:sp>
         <p:nvSpPr>
-          <p:cNvPr id="2001447276" name="Text">
-    </p:cNvPr>
-          <p:cNvSpPr>
-            <a:spLocks noGrp="1"/>
-          </p:cNvSpPr>
-          <p:nvPr/>
-        </p:nvSpPr>
-        <p:spPr>
-          <a:xfrm rot="0">
-            <a:off x="3987800" y="1295400"/>
-            <a:ext cx="520700" cy="469900"/>
+          <p:cNvPr id="2001135082" name="Text">
+    </p:cNvPr>
+          <p:cNvSpPr>
+            <a:spLocks noGrp="1"/>
+          </p:cNvSpPr>
+          <p:nvPr/>
+        </p:nvSpPr>
+        <p:spPr>
+          <a:xfrm rot="0">
+            <a:off x="3759200" y="1295400"/>
+            <a:ext cx="457200" cy="469900"/>
           </a:xfrm>
           <a:prstGeom prst="rect">
             <a:avLst/>
@@ -5968,17 +5968,17 @@
       </p:sp>
       <p:sp>
         <p:nvSpPr>
-          <p:cNvPr id="849696276" name="Text">
-    </p:cNvPr>
-          <p:cNvSpPr>
-            <a:spLocks noGrp="1"/>
-          </p:cNvSpPr>
-          <p:nvPr/>
-        </p:nvSpPr>
-        <p:spPr>
-          <a:xfrm rot="0">
-            <a:off x="4508500" y="1295400"/>
-            <a:ext cx="495300" cy="469900"/>
+          <p:cNvPr id="1637073494" name="Text">
+    </p:cNvPr>
+          <p:cNvSpPr>
+            <a:spLocks noGrp="1"/>
+          </p:cNvSpPr>
+          <p:nvPr/>
+        </p:nvSpPr>
+        <p:spPr>
+          <a:xfrm rot="0">
+            <a:off x="4216400" y="1295400"/>
+            <a:ext cx="457200" cy="469900"/>
           </a:xfrm>
           <a:prstGeom prst="rect">
             <a:avLst/>
@@ -6032,16 +6032,16 @@
       </p:sp>
       <p:sp>
         <p:nvSpPr>
-          <p:cNvPr id="1946741387" name="Text">
-    </p:cNvPr>
-          <p:cNvSpPr>
-            <a:spLocks noGrp="1"/>
-          </p:cNvSpPr>
-          <p:nvPr/>
-        </p:nvSpPr>
-        <p:spPr>
-          <a:xfrm rot="0">
-            <a:off x="5575300" y="1295400"/>
+          <p:cNvPr id="1682584689" name="Text">
+    </p:cNvPr>
+          <p:cNvSpPr>
+            <a:spLocks noGrp="1"/>
+          </p:cNvSpPr>
+          <p:nvPr/>
+        </p:nvSpPr>
+        <p:spPr>
+          <a:xfrm rot="0">
+            <a:off x="5207000" y="1295400"/>
             <a:ext cx="609600" cy="469900"/>
           </a:xfrm>
           <a:prstGeom prst="rect">
@@ -6096,17 +6096,17 @@
       </p:sp>
       <p:sp>
         <p:nvSpPr>
-          <p:cNvPr id="1765357048" name="Text">
-    </p:cNvPr>
-          <p:cNvSpPr>
-            <a:spLocks noGrp="1"/>
-          </p:cNvSpPr>
-          <p:nvPr/>
-        </p:nvSpPr>
-        <p:spPr>
-          <a:xfrm rot="0">
-            <a:off x="6184900" y="1295400"/>
-            <a:ext cx="3213100" cy="469900"/>
+          <p:cNvPr id="1370506899" name="Text">
+    </p:cNvPr>
+          <p:cNvSpPr>
+            <a:spLocks noGrp="1"/>
+          </p:cNvSpPr>
+          <p:nvPr/>
+        </p:nvSpPr>
+        <p:spPr>
+          <a:xfrm rot="0">
+            <a:off x="5816600" y="1295400"/>
+            <a:ext cx="3111500" cy="469900"/>
           </a:xfrm>
           <a:prstGeom prst="rect">
             <a:avLst/>
@@ -6151,17 +6151,17 @@
       </p:sp>
       <p:sp>
         <p:nvSpPr>
-          <p:cNvPr id="1125380474" name="Text">
-    </p:cNvPr>
-          <p:cNvSpPr>
-            <a:spLocks noGrp="1"/>
-          </p:cNvSpPr>
-          <p:nvPr/>
-        </p:nvSpPr>
-        <p:spPr>
-          <a:xfrm rot="0">
-            <a:off x="9398000" y="1295400"/>
-            <a:ext cx="495300" cy="469900"/>
+          <p:cNvPr id="295276794" name="Text">
+    </p:cNvPr>
+          <p:cNvSpPr>
+            <a:spLocks noGrp="1"/>
+          </p:cNvSpPr>
+          <p:nvPr/>
+        </p:nvSpPr>
+        <p:spPr>
+          <a:xfrm rot="0">
+            <a:off x="8928100" y="1295400"/>
+            <a:ext cx="457200" cy="469900"/>
           </a:xfrm>
           <a:prstGeom prst="rect">
             <a:avLst/>
@@ -6206,16 +6206,16 @@
       </p:sp>
       <p:sp>
         <p:nvSpPr>
-          <p:cNvPr id="1528699642" name="Text">
-    </p:cNvPr>
-          <p:cNvSpPr>
-            <a:spLocks noGrp="1"/>
-          </p:cNvSpPr>
-          <p:nvPr/>
-        </p:nvSpPr>
-        <p:spPr>
-          <a:xfrm rot="0">
-            <a:off x="5003800" y="1295400"/>
+          <p:cNvPr id="1860657645" name="Text">
+    </p:cNvPr>
+          <p:cNvSpPr>
+            <a:spLocks noGrp="1"/>
+          </p:cNvSpPr>
+          <p:nvPr/>
+        </p:nvSpPr>
+        <p:spPr>
+          <a:xfrm rot="0">
+            <a:off x="4673600" y="1295400"/>
             <a:ext cx="469900" cy="469900"/>
           </a:xfrm>
           <a:prstGeom prst="rect">
@@ -6270,17 +6270,17 @@
       </p:sp>
       <p:sp>
         <p:nvSpPr>
-          <p:cNvPr id="1760690080" name="Text">
-    </p:cNvPr>
-          <p:cNvSpPr>
-            <a:spLocks noGrp="1"/>
-          </p:cNvSpPr>
-          <p:nvPr/>
-        </p:nvSpPr>
-        <p:spPr>
-          <a:xfrm rot="0">
-            <a:off x="9893300" y="1295400"/>
-            <a:ext cx="469900" cy="469900"/>
+          <p:cNvPr id="1538992636" name="Text">
+    </p:cNvPr>
+          <p:cNvSpPr>
+            <a:spLocks noGrp="1"/>
+          </p:cNvSpPr>
+          <p:nvPr/>
+        </p:nvSpPr>
+        <p:spPr>
+          <a:xfrm rot="0">
+            <a:off x="9385300" y="1295400"/>
+            <a:ext cx="457200" cy="469900"/>
           </a:xfrm>
           <a:prstGeom prst="rect">
             <a:avLst/>
@@ -6334,17 +6334,17 @@
       </p:sp>
       <p:sp>
         <p:nvSpPr>
-          <p:cNvPr id="1221034419" name="Text">
-    </p:cNvPr>
-          <p:cNvSpPr>
-            <a:spLocks noGrp="1"/>
-          </p:cNvSpPr>
-          <p:nvPr/>
-        </p:nvSpPr>
-        <p:spPr>
-          <a:xfrm rot="0">
-            <a:off x="9893300" y="1765300"/>
-            <a:ext cx="469900" cy="2120900"/>
+          <p:cNvPr id="149715142" name="Text">
+    </p:cNvPr>
+          <p:cNvSpPr>
+            <a:spLocks noGrp="1"/>
+          </p:cNvSpPr>
+          <p:nvPr/>
+        </p:nvSpPr>
+        <p:spPr>
+          <a:xfrm rot="0">
+            <a:off x="9385300" y="1765300"/>
+            <a:ext cx="457200" cy="2120900"/>
           </a:xfrm>
           <a:prstGeom prst="rect">
             <a:avLst/>
@@ -6396,17 +6396,17 @@
       </p:sp>
       <p:sp>
         <p:nvSpPr>
-          <p:cNvPr id="344142320" name="Text">
-    </p:cNvPr>
-          <p:cNvSpPr>
-            <a:spLocks noGrp="1"/>
-          </p:cNvSpPr>
-          <p:nvPr/>
-        </p:nvSpPr>
-        <p:spPr>
-          <a:xfrm rot="0">
-            <a:off x="9398000" y="1765300"/>
-            <a:ext cx="495300" cy="2120900"/>
+          <p:cNvPr id="1429157729" name="Text">
+    </p:cNvPr>
+          <p:cNvSpPr>
+            <a:spLocks noGrp="1"/>
+          </p:cNvSpPr>
+          <p:nvPr/>
+        </p:nvSpPr>
+        <p:spPr>
+          <a:xfrm rot="0">
+            <a:off x="8928100" y="1765300"/>
+            <a:ext cx="457200" cy="2120900"/>
           </a:xfrm>
           <a:prstGeom prst="rect">
             <a:avLst/>
@@ -6458,17 +6458,17 @@
       </p:sp>
       <p:sp>
         <p:nvSpPr>
-          <p:cNvPr id="1071718480" name="Text">
-    </p:cNvPr>
-          <p:cNvSpPr>
-            <a:spLocks noGrp="1"/>
-          </p:cNvSpPr>
-          <p:nvPr/>
-        </p:nvSpPr>
-        <p:spPr>
-          <a:xfrm rot="0">
-            <a:off x="6273800" y="1765300"/>
-            <a:ext cx="3111500" cy="2120900"/>
+          <p:cNvPr id="1236000" name="Text">
+    </p:cNvPr>
+          <p:cNvSpPr>
+            <a:spLocks noGrp="1"/>
+          </p:cNvSpPr>
+          <p:nvPr/>
+        </p:nvSpPr>
+        <p:spPr>
+          <a:xfrm rot="0">
+            <a:off x="5930900" y="1765300"/>
+            <a:ext cx="2984500" cy="2120900"/>
           </a:xfrm>
           <a:prstGeom prst="rect">
             <a:avLst/>
@@ -6514,16 +6514,16 @@
       </p:sp>
       <p:sp>
         <p:nvSpPr>
-          <p:cNvPr id="1485493491" name="Text">
-    </p:cNvPr>
-          <p:cNvSpPr>
-            <a:spLocks noGrp="1"/>
-          </p:cNvSpPr>
-          <p:nvPr/>
-        </p:nvSpPr>
-        <p:spPr>
-          <a:xfrm rot="0">
-            <a:off x="5575300" y="1765300"/>
+          <p:cNvPr id="40169751" name="Text">
+    </p:cNvPr>
+          <p:cNvSpPr>
+            <a:spLocks noGrp="1"/>
+          </p:cNvSpPr>
+          <p:nvPr/>
+        </p:nvSpPr>
+        <p:spPr>
+          <a:xfrm rot="0">
+            <a:off x="5207000" y="1765300"/>
             <a:ext cx="609600" cy="2120900"/>
           </a:xfrm>
           <a:prstGeom prst="rect">
@@ -6576,7 +6576,7 @@
       </p:sp>
       <p:sp>
         <p:nvSpPr>
-          <p:cNvPr id="741608520" name="Text">
+          <p:cNvPr id="1772458965" name="Text">
     </p:cNvPr>
           <p:cNvSpPr>
             <a:spLocks noGrp="1"/>
@@ -6638,17 +6638,17 @@
       </p:sp>
       <p:sp>
         <p:nvSpPr>
-          <p:cNvPr id="565556367" name="Text">
-    </p:cNvPr>
-          <p:cNvSpPr>
-            <a:spLocks noGrp="1"/>
-          </p:cNvSpPr>
-          <p:nvPr/>
-        </p:nvSpPr>
-        <p:spPr>
-          <a:xfrm rot="0">
-            <a:off x="723900" y="1765300"/>
-            <a:ext cx="3251200" cy="2120900"/>
+          <p:cNvPr id="1159538111" name="Text">
+    </p:cNvPr>
+          <p:cNvSpPr>
+            <a:spLocks noGrp="1"/>
+          </p:cNvSpPr>
+          <p:nvPr/>
+        </p:nvSpPr>
+        <p:spPr>
+          <a:xfrm rot="0">
+            <a:off x="762000" y="1765300"/>
+            <a:ext cx="2984500" cy="2120900"/>
           </a:xfrm>
           <a:prstGeom prst="rect">
             <a:avLst/>
@@ -6793,17 +6793,17 @@
       </p:sp>
       <p:sp>
         <p:nvSpPr>
-          <p:cNvPr id="392225609" name="Text">
-    </p:cNvPr>
-          <p:cNvSpPr>
-            <a:spLocks noGrp="1"/>
-          </p:cNvSpPr>
-          <p:nvPr/>
-        </p:nvSpPr>
-        <p:spPr>
-          <a:xfrm rot="0">
-            <a:off x="4508500" y="1765300"/>
-            <a:ext cx="495300" cy="2120900"/>
+          <p:cNvPr id="1408766688" name="Text">
+    </p:cNvPr>
+          <p:cNvSpPr>
+            <a:spLocks noGrp="1"/>
+          </p:cNvSpPr>
+          <p:nvPr/>
+        </p:nvSpPr>
+        <p:spPr>
+          <a:xfrm rot="0">
+            <a:off x="4216400" y="1765300"/>
+            <a:ext cx="457200" cy="2120900"/>
           </a:xfrm>
           <a:prstGeom prst="rect">
             <a:avLst/>
@@ -6906,16 +6906,16 @@
       </p:sp>
       <p:sp>
         <p:nvSpPr>
-          <p:cNvPr id="423858202" name="Text">
-    </p:cNvPr>
-          <p:cNvSpPr>
-            <a:spLocks noGrp="1"/>
-          </p:cNvSpPr>
-          <p:nvPr/>
-        </p:nvSpPr>
-        <p:spPr>
-          <a:xfrm rot="0">
-            <a:off x="5003800" y="1765300"/>
+          <p:cNvPr id="1982967233" name="Text">
+    </p:cNvPr>
+          <p:cNvSpPr>
+            <a:spLocks noGrp="1"/>
+          </p:cNvSpPr>
+          <p:nvPr/>
+        </p:nvSpPr>
+        <p:spPr>
+          <a:xfrm rot="0">
+            <a:off x="4673600" y="1765300"/>
             <a:ext cx="469900" cy="2120900"/>
           </a:xfrm>
           <a:prstGeom prst="rect">
@@ -7019,17 +7019,17 @@
       </p:sp>
       <p:sp>
         <p:nvSpPr>
-          <p:cNvPr id="362387766" name="Text">
-    </p:cNvPr>
-          <p:cNvSpPr>
-            <a:spLocks noGrp="1"/>
-          </p:cNvSpPr>
-          <p:nvPr/>
-        </p:nvSpPr>
-        <p:spPr>
-          <a:xfrm rot="0">
-            <a:off x="3987800" y="1765300"/>
-            <a:ext cx="520700" cy="2120900"/>
+          <p:cNvPr id="869250025" name="Text">
+    </p:cNvPr>
+          <p:cNvSpPr>
+            <a:spLocks noGrp="1"/>
+          </p:cNvSpPr>
+          <p:nvPr/>
+        </p:nvSpPr>
+        <p:spPr>
+          <a:xfrm rot="0">
+            <a:off x="3759200" y="1765300"/>
+            <a:ext cx="457200" cy="2120900"/>
           </a:xfrm>
           <a:prstGeom prst="rect">
             <a:avLst/>
@@ -7132,7 +7132,7 @@
       </p:sp>
       <p:sp>
         <p:nvSpPr>
-          <p:cNvPr id="428099270" name="Text">
+          <p:cNvPr id="533944562" name="Text">
     </p:cNvPr>
           <p:cNvSpPr>
             <a:spLocks noGrp="1"/>
@@ -7142,7 +7142,7 @@
         <p:spPr>
           <a:xfrm rot="0">
             <a:off x="647700" y="1765300"/>
-            <a:ext cx="3340100" cy="2120900"/>
+            <a:ext cx="3111500" cy="2120900"/>
           </a:xfrm>
           <a:prstGeom prst="rect">
             <a:avLst/>
@@ -7184,17 +7184,17 @@
       </p:sp>
       <p:sp>
         <p:nvSpPr>
-          <p:cNvPr id="158241812" name="Text">
-    </p:cNvPr>
-          <p:cNvSpPr>
-            <a:spLocks noGrp="1"/>
-          </p:cNvSpPr>
-          <p:nvPr/>
-        </p:nvSpPr>
-        <p:spPr>
-          <a:xfrm rot="0">
-            <a:off x="6184900" y="1765300"/>
-            <a:ext cx="3213100" cy="2120900"/>
+          <p:cNvPr id="212805370" name="Text">
+    </p:cNvPr>
+          <p:cNvSpPr>
+            <a:spLocks noGrp="1"/>
+          </p:cNvSpPr>
+          <p:nvPr/>
+        </p:nvSpPr>
+        <p:spPr>
+          <a:xfrm rot="0">
+            <a:off x="5816600" y="1765300"/>
+            <a:ext cx="3111500" cy="2120900"/>
           </a:xfrm>
           <a:prstGeom prst="rect">
             <a:avLst/>
@@ -7236,17 +7236,17 @@
       </p:sp>
       <p:sp>
         <p:nvSpPr>
-          <p:cNvPr id="203949667" name="Text">
-    </p:cNvPr>
-          <p:cNvSpPr>
-            <a:spLocks noGrp="1"/>
-          </p:cNvSpPr>
-          <p:nvPr/>
-        </p:nvSpPr>
-        <p:spPr>
-          <a:xfrm rot="0">
-            <a:off x="9893300" y="3962400"/>
-            <a:ext cx="469900" cy="2730500"/>
+          <p:cNvPr id="2005654795" name="Text">
+    </p:cNvPr>
+          <p:cNvSpPr>
+            <a:spLocks noGrp="1"/>
+          </p:cNvSpPr>
+          <p:nvPr/>
+        </p:nvSpPr>
+        <p:spPr>
+          <a:xfrm rot="0">
+            <a:off x="9385300" y="3886200"/>
+            <a:ext cx="457200" cy="2730500"/>
           </a:xfrm>
           <a:prstGeom prst="rect">
             <a:avLst/>
@@ -7305,17 +7305,17 @@
       </p:sp>
       <p:sp>
         <p:nvSpPr>
-          <p:cNvPr id="1436647161" name="Text">
-    </p:cNvPr>
-          <p:cNvSpPr>
-            <a:spLocks noGrp="1"/>
-          </p:cNvSpPr>
-          <p:nvPr/>
-        </p:nvSpPr>
-        <p:spPr>
-          <a:xfrm rot="0">
-            <a:off x="9398000" y="3962400"/>
-            <a:ext cx="495300" cy="2730500"/>
+          <p:cNvPr id="966097128" name="Text">
+    </p:cNvPr>
+          <p:cNvSpPr>
+            <a:spLocks noGrp="1"/>
+          </p:cNvSpPr>
+          <p:nvPr/>
+        </p:nvSpPr>
+        <p:spPr>
+          <a:xfrm rot="0">
+            <a:off x="8928100" y="3886200"/>
+            <a:ext cx="457200" cy="2730500"/>
           </a:xfrm>
           <a:prstGeom prst="rect">
             <a:avLst/>
@@ -7374,17 +7374,17 @@
       </p:sp>
       <p:sp>
         <p:nvSpPr>
-          <p:cNvPr id="1848156413" name="Text">
-    </p:cNvPr>
-          <p:cNvSpPr>
-            <a:spLocks noGrp="1"/>
-          </p:cNvSpPr>
-          <p:nvPr/>
-        </p:nvSpPr>
-        <p:spPr>
-          <a:xfrm rot="0">
-            <a:off x="6273800" y="3962400"/>
-            <a:ext cx="3111500" cy="2730500"/>
+          <p:cNvPr id="1006937056" name="Text">
+    </p:cNvPr>
+          <p:cNvSpPr>
+            <a:spLocks noGrp="1"/>
+          </p:cNvSpPr>
+          <p:nvPr/>
+        </p:nvSpPr>
+        <p:spPr>
+          <a:xfrm rot="0">
+            <a:off x="5930900" y="3886200"/>
+            <a:ext cx="2984500" cy="2730500"/>
           </a:xfrm>
           <a:prstGeom prst="rect">
             <a:avLst/>
@@ -7493,16 +7493,16 @@
       </p:sp>
       <p:sp>
         <p:nvSpPr>
-          <p:cNvPr id="320554776" name="Text">
-    </p:cNvPr>
-          <p:cNvSpPr>
-            <a:spLocks noGrp="1"/>
-          </p:cNvSpPr>
-          <p:nvPr/>
-        </p:nvSpPr>
-        <p:spPr>
-          <a:xfrm rot="0">
-            <a:off x="5575300" y="3962400"/>
+          <p:cNvPr id="1240062572" name="Text">
+    </p:cNvPr>
+          <p:cNvSpPr>
+            <a:spLocks noGrp="1"/>
+          </p:cNvSpPr>
+          <p:nvPr/>
+        </p:nvSpPr>
+        <p:spPr>
+          <a:xfrm rot="0">
+            <a:off x="5207000" y="3886200"/>
             <a:ext cx="609600" cy="2730500"/>
           </a:xfrm>
           <a:prstGeom prst="rect">
@@ -7564,16 +7564,16 @@
       </p:sp>
       <p:sp>
         <p:nvSpPr>
-          <p:cNvPr id="1598832646" name="Text">
-    </p:cNvPr>
-          <p:cNvSpPr>
-            <a:spLocks noGrp="1"/>
-          </p:cNvSpPr>
-          <p:nvPr/>
-        </p:nvSpPr>
-        <p:spPr>
-          <a:xfrm rot="0">
-            <a:off x="38100" y="3962400"/>
+          <p:cNvPr id="1621304799" name="Text">
+    </p:cNvPr>
+          <p:cNvSpPr>
+            <a:spLocks noGrp="1"/>
+          </p:cNvSpPr>
+          <p:nvPr/>
+        </p:nvSpPr>
+        <p:spPr>
+          <a:xfrm rot="0">
+            <a:off x="38100" y="3886200"/>
             <a:ext cx="609600" cy="2730500"/>
           </a:xfrm>
           <a:prstGeom prst="rect">
@@ -7635,17 +7635,17 @@
       </p:sp>
       <p:sp>
         <p:nvSpPr>
-          <p:cNvPr id="29666208" name="Text">
-    </p:cNvPr>
-          <p:cNvSpPr>
-            <a:spLocks noGrp="1"/>
-          </p:cNvSpPr>
-          <p:nvPr/>
-        </p:nvSpPr>
-        <p:spPr>
-          <a:xfrm rot="0">
-            <a:off x="723900" y="3962400"/>
-            <a:ext cx="3251200" cy="2730500"/>
+          <p:cNvPr id="1919111963" name="Text">
+    </p:cNvPr>
+          <p:cNvSpPr>
+            <a:spLocks noGrp="1"/>
+          </p:cNvSpPr>
+          <p:nvPr/>
+        </p:nvSpPr>
+        <p:spPr>
+          <a:xfrm rot="0">
+            <a:off x="762000" y="3886200"/>
+            <a:ext cx="2984500" cy="2730500"/>
           </a:xfrm>
           <a:prstGeom prst="rect">
             <a:avLst/>
@@ -7826,17 +7826,17 @@
       </p:sp>
       <p:sp>
         <p:nvSpPr>
-          <p:cNvPr id="708893741" name="Text">
-    </p:cNvPr>
-          <p:cNvSpPr>
-            <a:spLocks noGrp="1"/>
-          </p:cNvSpPr>
-          <p:nvPr/>
-        </p:nvSpPr>
-        <p:spPr>
-          <a:xfrm rot="0">
-            <a:off x="4508500" y="3962400"/>
-            <a:ext cx="495300" cy="2730500"/>
+          <p:cNvPr id="1809966356" name="Text">
+    </p:cNvPr>
+          <p:cNvSpPr>
+            <a:spLocks noGrp="1"/>
+          </p:cNvSpPr>
+          <p:nvPr/>
+        </p:nvSpPr>
+        <p:spPr>
+          <a:xfrm rot="0">
+            <a:off x="4216400" y="3886200"/>
+            <a:ext cx="457200" cy="2730500"/>
           </a:xfrm>
           <a:prstGeom prst="rect">
             <a:avLst/>
@@ -7919,16 +7919,16 @@
       </p:sp>
       <p:sp>
         <p:nvSpPr>
-          <p:cNvPr id="1672117754" name="Text">
-    </p:cNvPr>
-          <p:cNvSpPr>
-            <a:spLocks noGrp="1"/>
-          </p:cNvSpPr>
-          <p:nvPr/>
-        </p:nvSpPr>
-        <p:spPr>
-          <a:xfrm rot="0">
-            <a:off x="5003800" y="3962400"/>
+          <p:cNvPr id="1817999550" name="Text">
+    </p:cNvPr>
+          <p:cNvSpPr>
+            <a:spLocks noGrp="1"/>
+          </p:cNvSpPr>
+          <p:nvPr/>
+        </p:nvSpPr>
+        <p:spPr>
+          <a:xfrm rot="0">
+            <a:off x="4673600" y="3886200"/>
             <a:ext cx="469900" cy="2730500"/>
           </a:xfrm>
           <a:prstGeom prst="rect">
@@ -8012,17 +8012,17 @@
       </p:sp>
       <p:sp>
         <p:nvSpPr>
-          <p:cNvPr id="1591434745" name="Text">
-    </p:cNvPr>
-          <p:cNvSpPr>
-            <a:spLocks noGrp="1"/>
-          </p:cNvSpPr>
-          <p:nvPr/>
-        </p:nvSpPr>
-        <p:spPr>
-          <a:xfrm rot="0">
-            <a:off x="3987800" y="3962400"/>
-            <a:ext cx="520700" cy="2730500"/>
+          <p:cNvPr id="354952503" name="Text">
+    </p:cNvPr>
+          <p:cNvSpPr>
+            <a:spLocks noGrp="1"/>
+          </p:cNvSpPr>
+          <p:nvPr/>
+        </p:nvSpPr>
+        <p:spPr>
+          <a:xfrm rot="0">
+            <a:off x="3759200" y="3886200"/>
+            <a:ext cx="457200" cy="2730500"/>
           </a:xfrm>
           <a:prstGeom prst="rect">
             <a:avLst/>
@@ -8105,17 +8105,17 @@
       </p:sp>
       <p:sp>
         <p:nvSpPr>
-          <p:cNvPr id="2061923369" name="Text">
-    </p:cNvPr>
-          <p:cNvSpPr>
-            <a:spLocks noGrp="1"/>
-          </p:cNvSpPr>
-          <p:nvPr/>
-        </p:nvSpPr>
-        <p:spPr>
-          <a:xfrm rot="0">
-            <a:off x="647700" y="3962400"/>
-            <a:ext cx="3340100" cy="2730500"/>
+          <p:cNvPr id="2109425410" name="Text">
+    </p:cNvPr>
+          <p:cNvSpPr>
+            <a:spLocks noGrp="1"/>
+          </p:cNvSpPr>
+          <p:nvPr/>
+        </p:nvSpPr>
+        <p:spPr>
+          <a:xfrm rot="0">
+            <a:off x="647700" y="3886200"/>
+            <a:ext cx="3111500" cy="2730500"/>
           </a:xfrm>
           <a:prstGeom prst="rect">
             <a:avLst/>
@@ -8157,17 +8157,17 @@
       </p:sp>
       <p:sp>
         <p:nvSpPr>
-          <p:cNvPr id="1449881324" name="Text">
-    </p:cNvPr>
-          <p:cNvSpPr>
-            <a:spLocks noGrp="1"/>
-          </p:cNvSpPr>
-          <p:nvPr/>
-        </p:nvSpPr>
-        <p:spPr>
-          <a:xfrm rot="0">
-            <a:off x="6184900" y="3962400"/>
-            <a:ext cx="3213100" cy="2730500"/>
+          <p:cNvPr id="429315300" name="Text">
+    </p:cNvPr>
+          <p:cNvSpPr>
+            <a:spLocks noGrp="1"/>
+          </p:cNvSpPr>
+          <p:nvPr/>
+        </p:nvSpPr>
+        <p:spPr>
+          <a:xfrm rot="0">
+            <a:off x="5816600" y="3886200"/>
+            <a:ext cx="3111500" cy="2730500"/>
           </a:xfrm>
           <a:prstGeom prst="rect">
             <a:avLst/>
@@ -8234,17 +8234,17 @@
       </p:grpSpPr>
       <p:sp>
         <p:nvSpPr>
-          <p:cNvPr id="1721666678" name="Text">
-    </p:cNvPr>
-          <p:cNvSpPr>
-            <a:spLocks noGrp="1"/>
-          </p:cNvSpPr>
-          <p:nvPr/>
-        </p:nvSpPr>
-        <p:spPr>
-          <a:xfrm rot="0">
-            <a:off x="5664200" y="838200"/>
-            <a:ext cx="4673600" cy="381000"/>
+          <p:cNvPr id="377538272" name="Text">
+    </p:cNvPr>
+          <p:cNvSpPr>
+            <a:spLocks noGrp="1"/>
+          </p:cNvSpPr>
+          <p:nvPr/>
+        </p:nvSpPr>
+        <p:spPr>
+          <a:xfrm rot="0">
+            <a:off x="5219700" y="825500"/>
+            <a:ext cx="4660900" cy="381000"/>
           </a:xfrm>
           <a:prstGeom prst="rect">
             <a:avLst/>
@@ -8283,17 +8283,17 @@
       </p:sp>
       <p:sp>
         <p:nvSpPr>
-          <p:cNvPr id="1655583177" name="Text">
-    </p:cNvPr>
-          <p:cNvSpPr>
-            <a:spLocks noGrp="1"/>
-          </p:cNvSpPr>
-          <p:nvPr/>
-        </p:nvSpPr>
-        <p:spPr>
-          <a:xfrm rot="0">
-            <a:off x="114300" y="838200"/>
-            <a:ext cx="5245100" cy="381000"/>
+          <p:cNvPr id="1112885402" name="Text">
+    </p:cNvPr>
+          <p:cNvSpPr>
+            <a:spLocks noGrp="1"/>
+          </p:cNvSpPr>
+          <p:nvPr/>
+        </p:nvSpPr>
+        <p:spPr>
+          <a:xfrm rot="0">
+            <a:off x="88900" y="825500"/>
+            <a:ext cx="5067300" cy="381000"/>
           </a:xfrm>
           <a:prstGeom prst="rect">
             <a:avLst/>
@@ -8332,17 +8332,17 @@
       </p:sp>
       <p:sp>
         <p:nvSpPr>
-          <p:cNvPr id="731928201" name="Text">
-    </p:cNvPr>
-          <p:cNvSpPr>
-            <a:spLocks noGrp="1"/>
-          </p:cNvSpPr>
-          <p:nvPr/>
-        </p:nvSpPr>
-        <p:spPr>
-          <a:xfrm rot="0">
-            <a:off x="139700" y="800100"/>
-            <a:ext cx="5168900" cy="381000"/>
+          <p:cNvPr id="1710331013" name="Text">
+    </p:cNvPr>
+          <p:cNvSpPr>
+            <a:spLocks noGrp="1"/>
+          </p:cNvSpPr>
+          <p:nvPr/>
+        </p:nvSpPr>
+        <p:spPr>
+          <a:xfrm rot="0">
+            <a:off x="63500" y="800100"/>
+            <a:ext cx="5054600" cy="381000"/>
           </a:xfrm>
           <a:prstGeom prst="rect">
             <a:avLst/>
@@ -8381,17 +8381,17 @@
       </p:sp>
       <p:sp>
         <p:nvSpPr>
-          <p:cNvPr id="649154847" name="Text">
-    </p:cNvPr>
-          <p:cNvSpPr>
-            <a:spLocks noGrp="1"/>
-          </p:cNvSpPr>
-          <p:nvPr/>
-        </p:nvSpPr>
-        <p:spPr>
-          <a:xfrm rot="0">
-            <a:off x="5664200" y="800100"/>
-            <a:ext cx="4622800" cy="381000"/>
+          <p:cNvPr id="1248812331" name="Text">
+    </p:cNvPr>
+          <p:cNvSpPr>
+            <a:spLocks noGrp="1"/>
+          </p:cNvSpPr>
+          <p:nvPr/>
+        </p:nvSpPr>
+        <p:spPr>
+          <a:xfrm rot="0">
+            <a:off x="5232400" y="800100"/>
+            <a:ext cx="4610100" cy="381000"/>
           </a:xfrm>
           <a:prstGeom prst="rect">
             <a:avLst/>
@@ -8430,7 +8430,7 @@
       </p:sp>
       <p:sp>
         <p:nvSpPr>
-          <p:cNvPr id="878609539" name="Text">
+          <p:cNvPr id="1514681664" name="Text">
     </p:cNvPr>
           <p:cNvSpPr>
             <a:spLocks noGrp="1"/>
@@ -8476,7 +8476,7 @@
       </p:sp>
       <p:sp>
         <p:nvSpPr>
-          <p:cNvPr id="669895608" name="Text">
+          <p:cNvPr id="850507531" name="Text">
     </p:cNvPr>
           <p:cNvSpPr>
             <a:spLocks noGrp="1"/>
@@ -8540,7 +8540,7 @@
       </p:sp>
       <p:sp>
         <p:nvSpPr>
-          <p:cNvPr id="240174546" name="Text">
+          <p:cNvPr id="1527597156" name="Text">
     </p:cNvPr>
           <p:cNvSpPr>
             <a:spLocks noGrp="1"/>
@@ -8550,7 +8550,7 @@
         <p:spPr>
           <a:xfrm rot="0">
             <a:off x="647700" y="1295400"/>
-            <a:ext cx="3340100" cy="469900"/>
+            <a:ext cx="3111500" cy="469900"/>
           </a:xfrm>
           <a:prstGeom prst="rect">
             <a:avLst/>
@@ -8595,17 +8595,17 @@
       </p:sp>
       <p:sp>
         <p:nvSpPr>
-          <p:cNvPr id="574964910" name="Text">
-    </p:cNvPr>
-          <p:cNvSpPr>
-            <a:spLocks noGrp="1"/>
-          </p:cNvSpPr>
-          <p:nvPr/>
-        </p:nvSpPr>
-        <p:spPr>
-          <a:xfrm rot="0">
-            <a:off x="3987800" y="1295400"/>
-            <a:ext cx="520700" cy="469900"/>
+          <p:cNvPr id="1799077931" name="Text">
+    </p:cNvPr>
+          <p:cNvSpPr>
+            <a:spLocks noGrp="1"/>
+          </p:cNvSpPr>
+          <p:nvPr/>
+        </p:nvSpPr>
+        <p:spPr>
+          <a:xfrm rot="0">
+            <a:off x="3759200" y="1295400"/>
+            <a:ext cx="457200" cy="469900"/>
           </a:xfrm>
           <a:prstGeom prst="rect">
             <a:avLst/>
@@ -8650,17 +8650,17 @@
       </p:sp>
       <p:sp>
         <p:nvSpPr>
-          <p:cNvPr id="1652537081" name="Text">
-    </p:cNvPr>
-          <p:cNvSpPr>
-            <a:spLocks noGrp="1"/>
-          </p:cNvSpPr>
-          <p:nvPr/>
-        </p:nvSpPr>
-        <p:spPr>
-          <a:xfrm rot="0">
-            <a:off x="4508500" y="1295400"/>
-            <a:ext cx="495300" cy="469900"/>
+          <p:cNvPr id="1891764793" name="Text">
+    </p:cNvPr>
+          <p:cNvSpPr>
+            <a:spLocks noGrp="1"/>
+          </p:cNvSpPr>
+          <p:nvPr/>
+        </p:nvSpPr>
+        <p:spPr>
+          <a:xfrm rot="0">
+            <a:off x="4216400" y="1295400"/>
+            <a:ext cx="457200" cy="469900"/>
           </a:xfrm>
           <a:prstGeom prst="rect">
             <a:avLst/>
@@ -8714,16 +8714,16 @@
       </p:sp>
       <p:sp>
         <p:nvSpPr>
-          <p:cNvPr id="730206469" name="Text">
-    </p:cNvPr>
-          <p:cNvSpPr>
-            <a:spLocks noGrp="1"/>
-          </p:cNvSpPr>
-          <p:nvPr/>
-        </p:nvSpPr>
-        <p:spPr>
-          <a:xfrm rot="0">
-            <a:off x="5575300" y="1295400"/>
+          <p:cNvPr id="1341452997" name="Text">
+    </p:cNvPr>
+          <p:cNvSpPr>
+            <a:spLocks noGrp="1"/>
+          </p:cNvSpPr>
+          <p:nvPr/>
+        </p:nvSpPr>
+        <p:spPr>
+          <a:xfrm rot="0">
+            <a:off x="5207000" y="1295400"/>
             <a:ext cx="609600" cy="469900"/>
           </a:xfrm>
           <a:prstGeom prst="rect">
@@ -8778,17 +8778,17 @@
       </p:sp>
       <p:sp>
         <p:nvSpPr>
-          <p:cNvPr id="602943474" name="Text">
-    </p:cNvPr>
-          <p:cNvSpPr>
-            <a:spLocks noGrp="1"/>
-          </p:cNvSpPr>
-          <p:nvPr/>
-        </p:nvSpPr>
-        <p:spPr>
-          <a:xfrm rot="0">
-            <a:off x="6184900" y="1295400"/>
-            <a:ext cx="3213100" cy="469900"/>
+          <p:cNvPr id="2123091255" name="Text">
+    </p:cNvPr>
+          <p:cNvSpPr>
+            <a:spLocks noGrp="1"/>
+          </p:cNvSpPr>
+          <p:nvPr/>
+        </p:nvSpPr>
+        <p:spPr>
+          <a:xfrm rot="0">
+            <a:off x="5816600" y="1295400"/>
+            <a:ext cx="3111500" cy="469900"/>
           </a:xfrm>
           <a:prstGeom prst="rect">
             <a:avLst/>
@@ -8833,17 +8833,17 @@
       </p:sp>
       <p:sp>
         <p:nvSpPr>
-          <p:cNvPr id="723021590" name="Text">
-    </p:cNvPr>
-          <p:cNvSpPr>
-            <a:spLocks noGrp="1"/>
-          </p:cNvSpPr>
-          <p:nvPr/>
-        </p:nvSpPr>
-        <p:spPr>
-          <a:xfrm rot="0">
-            <a:off x="9398000" y="1295400"/>
-            <a:ext cx="495300" cy="469900"/>
+          <p:cNvPr id="1266970709" name="Text">
+    </p:cNvPr>
+          <p:cNvSpPr>
+            <a:spLocks noGrp="1"/>
+          </p:cNvSpPr>
+          <p:nvPr/>
+        </p:nvSpPr>
+        <p:spPr>
+          <a:xfrm rot="0">
+            <a:off x="8928100" y="1295400"/>
+            <a:ext cx="457200" cy="469900"/>
           </a:xfrm>
           <a:prstGeom prst="rect">
             <a:avLst/>
@@ -8888,16 +8888,16 @@
       </p:sp>
       <p:sp>
         <p:nvSpPr>
-          <p:cNvPr id="886037746" name="Text">
-    </p:cNvPr>
-          <p:cNvSpPr>
-            <a:spLocks noGrp="1"/>
-          </p:cNvSpPr>
-          <p:nvPr/>
-        </p:nvSpPr>
-        <p:spPr>
-          <a:xfrm rot="0">
-            <a:off x="5003800" y="1295400"/>
+          <p:cNvPr id="737622238" name="Text">
+    </p:cNvPr>
+          <p:cNvSpPr>
+            <a:spLocks noGrp="1"/>
+          </p:cNvSpPr>
+          <p:nvPr/>
+        </p:nvSpPr>
+        <p:spPr>
+          <a:xfrm rot="0">
+            <a:off x="4673600" y="1295400"/>
             <a:ext cx="469900" cy="469900"/>
           </a:xfrm>
           <a:prstGeom prst="rect">
@@ -8952,17 +8952,17 @@
       </p:sp>
       <p:sp>
         <p:nvSpPr>
-          <p:cNvPr id="794488151" name="Text">
-    </p:cNvPr>
-          <p:cNvSpPr>
-            <a:spLocks noGrp="1"/>
-          </p:cNvSpPr>
-          <p:nvPr/>
-        </p:nvSpPr>
-        <p:spPr>
-          <a:xfrm rot="0">
-            <a:off x="9893300" y="1295400"/>
-            <a:ext cx="469900" cy="469900"/>
+          <p:cNvPr id="1140688319" name="Text">
+    </p:cNvPr>
+          <p:cNvSpPr>
+            <a:spLocks noGrp="1"/>
+          </p:cNvSpPr>
+          <p:nvPr/>
+        </p:nvSpPr>
+        <p:spPr>
+          <a:xfrm rot="0">
+            <a:off x="9385300" y="1295400"/>
+            <a:ext cx="457200" cy="469900"/>
           </a:xfrm>
           <a:prstGeom prst="rect">
             <a:avLst/>
@@ -9016,17 +9016,17 @@
       </p:sp>
       <p:sp>
         <p:nvSpPr>
-          <p:cNvPr id="234342641" name="Text">
-    </p:cNvPr>
-          <p:cNvSpPr>
-            <a:spLocks noGrp="1"/>
-          </p:cNvSpPr>
-          <p:nvPr/>
-        </p:nvSpPr>
-        <p:spPr>
-          <a:xfrm rot="0">
-            <a:off x="9893300" y="1765300"/>
-            <a:ext cx="469900" cy="1524000"/>
+          <p:cNvPr id="1673468546" name="Text">
+    </p:cNvPr>
+          <p:cNvSpPr>
+            <a:spLocks noGrp="1"/>
+          </p:cNvSpPr>
+          <p:nvPr/>
+        </p:nvSpPr>
+        <p:spPr>
+          <a:xfrm rot="0">
+            <a:off x="9385300" y="1765300"/>
+            <a:ext cx="457200" cy="1524000"/>
           </a:xfrm>
           <a:prstGeom prst="rect">
             <a:avLst/>
@@ -9087,17 +9087,17 @@
       </p:sp>
       <p:sp>
         <p:nvSpPr>
-          <p:cNvPr id="1702848134" name="Text">
-    </p:cNvPr>
-          <p:cNvSpPr>
-            <a:spLocks noGrp="1"/>
-          </p:cNvSpPr>
-          <p:nvPr/>
-        </p:nvSpPr>
-        <p:spPr>
-          <a:xfrm rot="0">
-            <a:off x="9398000" y="1765300"/>
-            <a:ext cx="495300" cy="1524000"/>
+          <p:cNvPr id="189913208" name="Text">
+    </p:cNvPr>
+          <p:cNvSpPr>
+            <a:spLocks noGrp="1"/>
+          </p:cNvSpPr>
+          <p:nvPr/>
+        </p:nvSpPr>
+        <p:spPr>
+          <a:xfrm rot="0">
+            <a:off x="8928100" y="1765300"/>
+            <a:ext cx="457200" cy="1524000"/>
           </a:xfrm>
           <a:prstGeom prst="rect">
             <a:avLst/>
@@ -9158,17 +9158,17 @@
       </p:sp>
       <p:sp>
         <p:nvSpPr>
-          <p:cNvPr id="790433431" name="Text">
-    </p:cNvPr>
-          <p:cNvSpPr>
-            <a:spLocks noGrp="1"/>
-          </p:cNvSpPr>
-          <p:nvPr/>
-        </p:nvSpPr>
-        <p:spPr>
-          <a:xfrm rot="0">
-            <a:off x="6273800" y="1765300"/>
-            <a:ext cx="3111500" cy="1524000"/>
+          <p:cNvPr id="435298308" name="Text">
+    </p:cNvPr>
+          <p:cNvSpPr>
+            <a:spLocks noGrp="1"/>
+          </p:cNvSpPr>
+          <p:nvPr/>
+        </p:nvSpPr>
+        <p:spPr>
+          <a:xfrm rot="0">
+            <a:off x="5930900" y="1765300"/>
+            <a:ext cx="2984500" cy="1524000"/>
           </a:xfrm>
           <a:prstGeom prst="rect">
             <a:avLst/>
@@ -9223,16 +9223,16 @@
       </p:sp>
       <p:sp>
         <p:nvSpPr>
-          <p:cNvPr id="1465216630" name="Text">
-    </p:cNvPr>
-          <p:cNvSpPr>
-            <a:spLocks noGrp="1"/>
-          </p:cNvSpPr>
-          <p:nvPr/>
-        </p:nvSpPr>
-        <p:spPr>
-          <a:xfrm rot="0">
-            <a:off x="5575300" y="1765300"/>
+          <p:cNvPr id="915250936" name="Text">
+    </p:cNvPr>
+          <p:cNvSpPr>
+            <a:spLocks noGrp="1"/>
+          </p:cNvSpPr>
+          <p:nvPr/>
+        </p:nvSpPr>
+        <p:spPr>
+          <a:xfrm rot="0">
+            <a:off x="5207000" y="1765300"/>
             <a:ext cx="609600" cy="1524000"/>
           </a:xfrm>
           <a:prstGeom prst="rect">
@@ -9303,7 +9303,7 @@
       </p:sp>
       <p:sp>
         <p:nvSpPr>
-          <p:cNvPr id="1691784237" name="Text">
+          <p:cNvPr id="771619233" name="Text">
     </p:cNvPr>
           <p:cNvSpPr>
             <a:spLocks noGrp="1"/>
@@ -9383,17 +9383,17 @@
       </p:sp>
       <p:sp>
         <p:nvSpPr>
-          <p:cNvPr id="2047051111" name="Text">
-    </p:cNvPr>
-          <p:cNvSpPr>
-            <a:spLocks noGrp="1"/>
-          </p:cNvSpPr>
-          <p:nvPr/>
-        </p:nvSpPr>
-        <p:spPr>
-          <a:xfrm rot="0">
-            <a:off x="723900" y="1765300"/>
-            <a:ext cx="3251200" cy="1524000"/>
+          <p:cNvPr id="686454398" name="Text">
+    </p:cNvPr>
+          <p:cNvSpPr>
+            <a:spLocks noGrp="1"/>
+          </p:cNvSpPr>
+          <p:nvPr/>
+        </p:nvSpPr>
+        <p:spPr>
+          <a:xfrm rot="0">
+            <a:off x="762000" y="1765300"/>
+            <a:ext cx="2984500" cy="1524000"/>
           </a:xfrm>
           <a:prstGeom prst="rect">
             <a:avLst/>
@@ -9466,17 +9466,17 @@
       </p:sp>
       <p:sp>
         <p:nvSpPr>
-          <p:cNvPr id="1034765574" name="Text">
-    </p:cNvPr>
-          <p:cNvSpPr>
-            <a:spLocks noGrp="1"/>
-          </p:cNvSpPr>
-          <p:nvPr/>
-        </p:nvSpPr>
-        <p:spPr>
-          <a:xfrm rot="0">
-            <a:off x="4508500" y="1765300"/>
-            <a:ext cx="495300" cy="1524000"/>
+          <p:cNvPr id="537956711" name="Text">
+    </p:cNvPr>
+          <p:cNvSpPr>
+            <a:spLocks noGrp="1"/>
+          </p:cNvSpPr>
+          <p:nvPr/>
+        </p:nvSpPr>
+        <p:spPr>
+          <a:xfrm rot="0">
+            <a:off x="4216400" y="1765300"/>
+            <a:ext cx="457200" cy="1524000"/>
           </a:xfrm>
           <a:prstGeom prst="rect">
             <a:avLst/>
@@ -9555,16 +9555,16 @@
       </p:sp>
       <p:sp>
         <p:nvSpPr>
-          <p:cNvPr id="1098365467" name="Text">
-    </p:cNvPr>
-          <p:cNvSpPr>
-            <a:spLocks noGrp="1"/>
-          </p:cNvSpPr>
-          <p:nvPr/>
-        </p:nvSpPr>
-        <p:spPr>
-          <a:xfrm rot="0">
-            <a:off x="5003800" y="1765300"/>
+          <p:cNvPr id="2050007491" name="Text">
+    </p:cNvPr>
+          <p:cNvSpPr>
+            <a:spLocks noGrp="1"/>
+          </p:cNvSpPr>
+          <p:nvPr/>
+        </p:nvSpPr>
+        <p:spPr>
+          <a:xfrm rot="0">
+            <a:off x="4673600" y="1765300"/>
             <a:ext cx="469900" cy="1524000"/>
           </a:xfrm>
           <a:prstGeom prst="rect">
@@ -9644,17 +9644,17 @@
       </p:sp>
       <p:sp>
         <p:nvSpPr>
-          <p:cNvPr id="298854884" name="Text">
-    </p:cNvPr>
-          <p:cNvSpPr>
-            <a:spLocks noGrp="1"/>
-          </p:cNvSpPr>
-          <p:nvPr/>
-        </p:nvSpPr>
-        <p:spPr>
-          <a:xfrm rot="0">
-            <a:off x="3987800" y="1765300"/>
-            <a:ext cx="520700" cy="1524000"/>
+          <p:cNvPr id="952270805" name="Text">
+    </p:cNvPr>
+          <p:cNvSpPr>
+            <a:spLocks noGrp="1"/>
+          </p:cNvSpPr>
+          <p:nvPr/>
+        </p:nvSpPr>
+        <p:spPr>
+          <a:xfrm rot="0">
+            <a:off x="3759200" y="1765300"/>
+            <a:ext cx="457200" cy="1524000"/>
           </a:xfrm>
           <a:prstGeom prst="rect">
             <a:avLst/>
@@ -9733,7 +9733,7 @@
       </p:sp>
       <p:sp>
         <p:nvSpPr>
-          <p:cNvPr id="1998503428" name="Text">
+          <p:cNvPr id="1130407733" name="Text">
     </p:cNvPr>
           <p:cNvSpPr>
             <a:spLocks noGrp="1"/>
@@ -9743,7 +9743,7 @@
         <p:spPr>
           <a:xfrm rot="0">
             <a:off x="647700" y="1765300"/>
-            <a:ext cx="3340100" cy="1524000"/>
+            <a:ext cx="3111500" cy="1524000"/>
           </a:xfrm>
           <a:prstGeom prst="rect">
             <a:avLst/>
@@ -9785,17 +9785,17 @@
       </p:sp>
       <p:sp>
         <p:nvSpPr>
-          <p:cNvPr id="550260884" name="Text">
-    </p:cNvPr>
-          <p:cNvSpPr>
-            <a:spLocks noGrp="1"/>
-          </p:cNvSpPr>
-          <p:nvPr/>
-        </p:nvSpPr>
-        <p:spPr>
-          <a:xfrm rot="0">
-            <a:off x="6184900" y="1765300"/>
-            <a:ext cx="3213100" cy="1524000"/>
+          <p:cNvPr id="1742704023" name="Text">
+    </p:cNvPr>
+          <p:cNvSpPr>
+            <a:spLocks noGrp="1"/>
+          </p:cNvSpPr>
+          <p:nvPr/>
+        </p:nvSpPr>
+        <p:spPr>
+          <a:xfrm rot="0">
+            <a:off x="5816600" y="1765300"/>
+            <a:ext cx="3111500" cy="1524000"/>
           </a:xfrm>
           <a:prstGeom prst="rect">
             <a:avLst/>

</xml_diff>